<commit_message>
Added p-values to four_roles.pptx
</commit_message>
<xml_diff>
--- a/images/four_roles.pptx
+++ b/images/four_roles.pptx
@@ -197,7 +197,7 @@
           <a:p>
             <a:fld id="{5287E838-B934-9A4E-A2B5-3CCDE18DB13D}" type="datetimeFigureOut">
               <a:rPr lang="en-US" smtClean="0"/>
-              <a:t>3/14/23</a:t>
+              <a:t>8/8/23</a:t>
             </a:fld>
             <a:endParaRPr lang="en-US"/>
           </a:p>
@@ -687,7 +687,7 @@
           <a:p>
             <a:fld id="{6791DA09-DD71-9144-9C0F-73C0A1D070B2}" type="datetimeFigureOut">
               <a:rPr lang="en-US" smtClean="0"/>
-              <a:t>3/14/23</a:t>
+              <a:t>8/8/23</a:t>
             </a:fld>
             <a:endParaRPr lang="en-US"/>
           </a:p>
@@ -857,7 +857,7 @@
           <a:p>
             <a:fld id="{6791DA09-DD71-9144-9C0F-73C0A1D070B2}" type="datetimeFigureOut">
               <a:rPr lang="en-US" smtClean="0"/>
-              <a:t>3/14/23</a:t>
+              <a:t>8/8/23</a:t>
             </a:fld>
             <a:endParaRPr lang="en-US"/>
           </a:p>
@@ -1037,7 +1037,7 @@
           <a:p>
             <a:fld id="{6791DA09-DD71-9144-9C0F-73C0A1D070B2}" type="datetimeFigureOut">
               <a:rPr lang="en-US" smtClean="0"/>
-              <a:t>3/14/23</a:t>
+              <a:t>8/8/23</a:t>
             </a:fld>
             <a:endParaRPr lang="en-US"/>
           </a:p>
@@ -1207,7 +1207,7 @@
           <a:p>
             <a:fld id="{6791DA09-DD71-9144-9C0F-73C0A1D070B2}" type="datetimeFigureOut">
               <a:rPr lang="en-US" smtClean="0"/>
-              <a:t>3/14/23</a:t>
+              <a:t>8/8/23</a:t>
             </a:fld>
             <a:endParaRPr lang="en-US"/>
           </a:p>
@@ -1451,7 +1451,7 @@
           <a:p>
             <a:fld id="{6791DA09-DD71-9144-9C0F-73C0A1D070B2}" type="datetimeFigureOut">
               <a:rPr lang="en-US" smtClean="0"/>
-              <a:t>3/14/23</a:t>
+              <a:t>8/8/23</a:t>
             </a:fld>
             <a:endParaRPr lang="en-US"/>
           </a:p>
@@ -1683,7 +1683,7 @@
           <a:p>
             <a:fld id="{6791DA09-DD71-9144-9C0F-73C0A1D070B2}" type="datetimeFigureOut">
               <a:rPr lang="en-US" smtClean="0"/>
-              <a:t>3/14/23</a:t>
+              <a:t>8/8/23</a:t>
             </a:fld>
             <a:endParaRPr lang="en-US"/>
           </a:p>
@@ -2050,7 +2050,7 @@
           <a:p>
             <a:fld id="{6791DA09-DD71-9144-9C0F-73C0A1D070B2}" type="datetimeFigureOut">
               <a:rPr lang="en-US" smtClean="0"/>
-              <a:t>3/14/23</a:t>
+              <a:t>8/8/23</a:t>
             </a:fld>
             <a:endParaRPr lang="en-US"/>
           </a:p>
@@ -2168,7 +2168,7 @@
           <a:p>
             <a:fld id="{6791DA09-DD71-9144-9C0F-73C0A1D070B2}" type="datetimeFigureOut">
               <a:rPr lang="en-US" smtClean="0"/>
-              <a:t>3/14/23</a:t>
+              <a:t>8/8/23</a:t>
             </a:fld>
             <a:endParaRPr lang="en-US"/>
           </a:p>
@@ -2263,7 +2263,7 @@
           <a:p>
             <a:fld id="{6791DA09-DD71-9144-9C0F-73C0A1D070B2}" type="datetimeFigureOut">
               <a:rPr lang="en-US" smtClean="0"/>
-              <a:t>3/14/23</a:t>
+              <a:t>8/8/23</a:t>
             </a:fld>
             <a:endParaRPr lang="en-US"/>
           </a:p>
@@ -2540,7 +2540,7 @@
           <a:p>
             <a:fld id="{6791DA09-DD71-9144-9C0F-73C0A1D070B2}" type="datetimeFigureOut">
               <a:rPr lang="en-US" smtClean="0"/>
-              <a:t>3/14/23</a:t>
+              <a:t>8/8/23</a:t>
             </a:fld>
             <a:endParaRPr lang="en-US"/>
           </a:p>
@@ -2797,7 +2797,7 @@
           <a:p>
             <a:fld id="{6791DA09-DD71-9144-9C0F-73C0A1D070B2}" type="datetimeFigureOut">
               <a:rPr lang="en-US" smtClean="0"/>
-              <a:t>3/14/23</a:t>
+              <a:t>8/8/23</a:t>
             </a:fld>
             <a:endParaRPr lang="en-US"/>
           </a:p>
@@ -3010,7 +3010,7 @@
           <a:p>
             <a:fld id="{6791DA09-DD71-9144-9C0F-73C0A1D070B2}" type="datetimeFigureOut">
               <a:rPr lang="en-US" smtClean="0"/>
-              <a:t>3/14/23</a:t>
+              <a:t>8/8/23</a:t>
             </a:fld>
             <a:endParaRPr lang="en-US"/>
           </a:p>
@@ -5725,10 +5725,10 @@
           <a:p>
             <a:pPr algn="ctr"/>
             <a:r>
-              <a:rPr lang="en-US" b="1" dirty="0"/>
+              <a:rPr lang="en-US" dirty="0"/>
               <a:t>adj p-value = 0.3</a:t>
             </a:r>
-            <a:endParaRPr lang="en-US" b="1" baseline="30000" dirty="0"/>
+            <a:endParaRPr lang="en-US" baseline="30000" dirty="0"/>
           </a:p>
         </p:txBody>
       </p:sp>
@@ -5762,10 +5762,10 @@
           <a:p>
             <a:pPr algn="ctr"/>
             <a:r>
-              <a:rPr lang="en-US" b="1" dirty="0"/>
+              <a:rPr lang="en-US" dirty="0"/>
               <a:t>adj p-value = 0.82</a:t>
             </a:r>
-            <a:endParaRPr lang="en-US" b="1" baseline="30000" dirty="0"/>
+            <a:endParaRPr lang="en-US" baseline="30000" dirty="0"/>
           </a:p>
         </p:txBody>
       </p:sp>
@@ -5799,10 +5799,10 @@
           <a:p>
             <a:pPr algn="ctr"/>
             <a:r>
-              <a:rPr lang="en-US" b="1" dirty="0"/>
+              <a:rPr lang="en-US" dirty="0"/>
               <a:t>adj p-value = 0.071</a:t>
             </a:r>
-            <a:endParaRPr lang="en-US" b="1" baseline="30000" dirty="0"/>
+            <a:endParaRPr lang="en-US" baseline="30000" dirty="0"/>
           </a:p>
         </p:txBody>
       </p:sp>
@@ -5903,7 +5903,7 @@
           <p:nvPr>
             <p:extLst>
               <p:ext uri="{D42A27DB-BD31-4B8C-83A1-F6EECF244321}">
-                <p14:modId xmlns:p14="http://schemas.microsoft.com/office/powerpoint/2010/main" val="760298210"/>
+                <p14:modId xmlns:p14="http://schemas.microsoft.com/office/powerpoint/2010/main" val="2128527641"/>
               </p:ext>
             </p:extLst>
           </p:nvPr>
@@ -5943,7 +5943,7 @@
                       <a:pPr algn="ctr"/>
                       <a:r>
                         <a:rPr lang="en-US" sz="1600" dirty="0"/>
-                        <a:t>TP=</a:t>
+                        <a:t>TP=10</a:t>
                       </a:r>
                     </a:p>
                   </a:txBody>
@@ -5957,7 +5957,7 @@
                       <a:pPr algn="ctr"/>
                       <a:r>
                         <a:rPr lang="en-US" sz="1600" dirty="0"/>
-                        <a:t>FP=</a:t>
+                        <a:t>FP=874</a:t>
                       </a:r>
                     </a:p>
                   </a:txBody>
@@ -5978,7 +5978,7 @@
                       <a:pPr algn="ctr"/>
                       <a:r>
                         <a:rPr lang="en-US" sz="1600" dirty="0"/>
-                        <a:t>FN=</a:t>
+                        <a:t>FN=422</a:t>
                       </a:r>
                     </a:p>
                   </a:txBody>
@@ -5992,7 +5992,7 @@
                       <a:pPr algn="ctr"/>
                       <a:r>
                         <a:rPr lang="en-US" sz="1600" dirty="0"/>
-                        <a:t>TN=</a:t>
+                        <a:t>TN=23395</a:t>
                       </a:r>
                     </a:p>
                   </a:txBody>
@@ -6064,7 +6064,7 @@
           <p:nvPr>
             <p:extLst>
               <p:ext uri="{D42A27DB-BD31-4B8C-83A1-F6EECF244321}">
-                <p14:modId xmlns:p14="http://schemas.microsoft.com/office/powerpoint/2010/main" val="3596433754"/>
+                <p14:modId xmlns:p14="http://schemas.microsoft.com/office/powerpoint/2010/main" val="4159618625"/>
               </p:ext>
             </p:extLst>
           </p:nvPr>
@@ -6104,7 +6104,7 @@
                       <a:pPr algn="ctr"/>
                       <a:r>
                         <a:rPr lang="en-US" sz="1600" dirty="0"/>
-                        <a:t>TP=</a:t>
+                        <a:t>TP=14</a:t>
                       </a:r>
                     </a:p>
                   </a:txBody>
@@ -6118,7 +6118,7 @@
                       <a:pPr algn="ctr"/>
                       <a:r>
                         <a:rPr lang="en-US" sz="1600" dirty="0"/>
-                        <a:t>FP=</a:t>
+                        <a:t>FP=488</a:t>
                       </a:r>
                     </a:p>
                   </a:txBody>
@@ -6139,7 +6139,7 @@
                       <a:pPr algn="ctr"/>
                       <a:r>
                         <a:rPr lang="en-US" sz="1600" dirty="0"/>
-                        <a:t>FN=</a:t>
+                        <a:t>FN=418</a:t>
                       </a:r>
                     </a:p>
                   </a:txBody>
@@ -6153,7 +6153,7 @@
                       <a:pPr algn="ctr"/>
                       <a:r>
                         <a:rPr lang="en-US" sz="1600" dirty="0"/>
-                        <a:t>TN=</a:t>
+                        <a:t>TN=23781</a:t>
                       </a:r>
                     </a:p>
                   </a:txBody>
@@ -6225,7 +6225,7 @@
           <p:nvPr>
             <p:extLst>
               <p:ext uri="{D42A27DB-BD31-4B8C-83A1-F6EECF244321}">
-                <p14:modId xmlns:p14="http://schemas.microsoft.com/office/powerpoint/2010/main" val="4019336698"/>
+                <p14:modId xmlns:p14="http://schemas.microsoft.com/office/powerpoint/2010/main" val="2411874982"/>
               </p:ext>
             </p:extLst>
           </p:nvPr>
@@ -6265,7 +6265,7 @@
                       <a:pPr algn="ctr"/>
                       <a:r>
                         <a:rPr lang="en-US" sz="1600" dirty="0"/>
-                        <a:t>TP=</a:t>
+                        <a:t>TP=20</a:t>
                       </a:r>
                     </a:p>
                   </a:txBody>
@@ -6279,7 +6279,7 @@
                       <a:pPr algn="ctr"/>
                       <a:r>
                         <a:rPr lang="en-US" sz="1600" dirty="0"/>
-                        <a:t>FP=</a:t>
+                        <a:t>FP=482</a:t>
                       </a:r>
                     </a:p>
                   </a:txBody>
@@ -6300,7 +6300,7 @@
                       <a:pPr algn="ctr"/>
                       <a:r>
                         <a:rPr lang="en-US" sz="1600" dirty="0"/>
-                        <a:t>FN=</a:t>
+                        <a:t>FN=576</a:t>
                       </a:r>
                     </a:p>
                   </a:txBody>
@@ -6314,7 +6314,7 @@
                       <a:pPr algn="ctr"/>
                       <a:r>
                         <a:rPr lang="en-US" sz="1600" dirty="0"/>
-                        <a:t>TN=</a:t>
+                        <a:t>TN=23623</a:t>
                       </a:r>
                     </a:p>
                   </a:txBody>
@@ -6571,6 +6571,10 @@
               <a:rPr lang="en-US" dirty="0"/>
               <a:t>p-value =</a:t>
             </a:r>
+            <a:r>
+              <a:rPr lang="ru-RU" dirty="0"/>
+              <a:t> 0.189</a:t>
+            </a:r>
             <a:endParaRPr lang="en-US" baseline="30000" dirty="0"/>
           </a:p>
         </p:txBody>
@@ -6608,6 +6612,10 @@
               <a:rPr lang="en-US" dirty="0"/>
               <a:t>p-value =</a:t>
             </a:r>
+            <a:r>
+              <a:rPr lang="ru-RU" dirty="0"/>
+              <a:t> 0.0826</a:t>
+            </a:r>
             <a:endParaRPr lang="en-US" baseline="30000" dirty="0"/>
           </a:p>
         </p:txBody>
@@ -6644,6 +6652,10 @@
             <a:r>
               <a:rPr lang="en-US" dirty="0"/>
               <a:t>p-value =</a:t>
+            </a:r>
+            <a:r>
+              <a:rPr lang="ru-RU" dirty="0"/>
+              <a:t> 0.027</a:t>
             </a:r>
             <a:endParaRPr lang="en-US" baseline="30000" dirty="0"/>
           </a:p>

</xml_diff>

<commit_message>
Added some confusion matrices to the figure
</commit_message>
<xml_diff>
--- a/images/four_roles.pptx
+++ b/images/four_roles.pptx
@@ -2,12 +2,12 @@
 <file path=ppt/presentation.xml><?xml version="1.0" encoding="utf-8"?>
 <p:presentation xmlns:a="http://schemas.openxmlformats.org/drawingml/2006/main" xmlns:r="http://schemas.openxmlformats.org/officeDocument/2006/relationships" xmlns:p="http://schemas.openxmlformats.org/presentationml/2006/main" saveSubsetFonts="1" autoCompressPictures="0">
   <p:sldMasterIdLst>
-    <p:sldMasterId id="2147483732" r:id="rId1"/>
+    <p:sldMasterId id="2147483768" r:id="rId1"/>
   </p:sldMasterIdLst>
   <p:sldIdLst>
     <p:sldId id="256" r:id="rId2"/>
   </p:sldIdLst>
-  <p:sldSz cx="10058400" cy="6583363"/>
+  <p:sldSz cx="22860000" cy="10058400"/>
   <p:notesSz cx="6858000" cy="9144000"/>
   <p:defaultTextStyle>
     <a:defPPr>
@@ -141,15 +141,15 @@
         </p:nvSpPr>
         <p:spPr>
           <a:xfrm>
-            <a:off x="754380" y="1077416"/>
-            <a:ext cx="8549640" cy="2291986"/>
+            <a:off x="2857500" y="1646133"/>
+            <a:ext cx="17145000" cy="3501813"/>
           </a:xfrm>
         </p:spPr>
         <p:txBody>
           <a:bodyPr anchor="b"/>
           <a:lstStyle>
             <a:lvl1pPr algn="ctr">
-              <a:defRPr sz="5760"/>
+              <a:defRPr sz="8800"/>
             </a:lvl1pPr>
           </a:lstStyle>
           <a:p>
@@ -173,8 +173,8 @@
         </p:nvSpPr>
         <p:spPr>
           <a:xfrm>
-            <a:off x="1257300" y="3457790"/>
-            <a:ext cx="7543800" cy="1589455"/>
+            <a:off x="2857500" y="5282989"/>
+            <a:ext cx="17145000" cy="2428451"/>
           </a:xfrm>
         </p:spPr>
         <p:txBody>
@@ -182,39 +182,39 @@
           <a:lstStyle>
             <a:lvl1pPr marL="0" indent="0" algn="ctr">
               <a:buNone/>
-              <a:defRPr sz="2304"/>
+              <a:defRPr sz="3520"/>
             </a:lvl1pPr>
-            <a:lvl2pPr marL="438912" indent="0" algn="ctr">
+            <a:lvl2pPr marL="670575" indent="0" algn="ctr">
               <a:buNone/>
-              <a:defRPr sz="1920"/>
+              <a:defRPr sz="2933"/>
             </a:lvl2pPr>
-            <a:lvl3pPr marL="877824" indent="0" algn="ctr">
+            <a:lvl3pPr marL="1341150" indent="0" algn="ctr">
               <a:buNone/>
-              <a:defRPr sz="1728"/>
+              <a:defRPr sz="2640"/>
             </a:lvl3pPr>
-            <a:lvl4pPr marL="1316736" indent="0" algn="ctr">
+            <a:lvl4pPr marL="2011726" indent="0" algn="ctr">
               <a:buNone/>
-              <a:defRPr sz="1536"/>
+              <a:defRPr sz="2347"/>
             </a:lvl4pPr>
-            <a:lvl5pPr marL="1755648" indent="0" algn="ctr">
+            <a:lvl5pPr marL="2682301" indent="0" algn="ctr">
               <a:buNone/>
-              <a:defRPr sz="1536"/>
+              <a:defRPr sz="2347"/>
             </a:lvl5pPr>
-            <a:lvl6pPr marL="2194560" indent="0" algn="ctr">
+            <a:lvl6pPr marL="3352876" indent="0" algn="ctr">
               <a:buNone/>
-              <a:defRPr sz="1536"/>
+              <a:defRPr sz="2347"/>
             </a:lvl6pPr>
-            <a:lvl7pPr marL="2633472" indent="0" algn="ctr">
+            <a:lvl7pPr marL="4023451" indent="0" algn="ctr">
               <a:buNone/>
-              <a:defRPr sz="1536"/>
+              <a:defRPr sz="2347"/>
             </a:lvl7pPr>
-            <a:lvl8pPr marL="3072384" indent="0" algn="ctr">
+            <a:lvl8pPr marL="4694027" indent="0" algn="ctr">
               <a:buNone/>
-              <a:defRPr sz="1536"/>
+              <a:defRPr sz="2347"/>
             </a:lvl8pPr>
-            <a:lvl9pPr marL="3511296" indent="0" algn="ctr">
+            <a:lvl9pPr marL="5364602" indent="0" algn="ctr">
               <a:buNone/>
-              <a:defRPr sz="1536"/>
+              <a:defRPr sz="2347"/>
             </a:lvl9pPr>
           </a:lstStyle>
           <a:p>
@@ -243,7 +243,7 @@
           <a:p>
             <a:fld id="{6791DA09-DD71-9144-9C0F-73C0A1D070B2}" type="datetimeFigureOut">
               <a:rPr lang="en-US" smtClean="0"/>
-              <a:t>8/12/22</a:t>
+              <a:t>10/2/23</a:t>
             </a:fld>
             <a:endParaRPr lang="en-US"/>
           </a:p>
@@ -294,7 +294,7 @@
     </p:spTree>
     <p:extLst>
       <p:ext uri="{BB962C8B-B14F-4D97-AF65-F5344CB8AC3E}">
-        <p14:creationId xmlns:p14="http://schemas.microsoft.com/office/powerpoint/2010/main" val="1722068684"/>
+        <p14:creationId xmlns:p14="http://schemas.microsoft.com/office/powerpoint/2010/main" val="2632603889"/>
       </p:ext>
     </p:extLst>
   </p:cSld>
@@ -413,7 +413,7 @@
           <a:p>
             <a:fld id="{6791DA09-DD71-9144-9C0F-73C0A1D070B2}" type="datetimeFigureOut">
               <a:rPr lang="en-US" smtClean="0"/>
-              <a:t>8/12/22</a:t>
+              <a:t>10/2/23</a:t>
             </a:fld>
             <a:endParaRPr lang="en-US"/>
           </a:p>
@@ -464,7 +464,7 @@
     </p:spTree>
     <p:extLst>
       <p:ext uri="{BB962C8B-B14F-4D97-AF65-F5344CB8AC3E}">
-        <p14:creationId xmlns:p14="http://schemas.microsoft.com/office/powerpoint/2010/main" val="3665045067"/>
+        <p14:creationId xmlns:p14="http://schemas.microsoft.com/office/powerpoint/2010/main" val="1804147282"/>
       </p:ext>
     </p:extLst>
   </p:cSld>
@@ -503,8 +503,8 @@
         </p:nvSpPr>
         <p:spPr>
           <a:xfrm>
-            <a:off x="7198043" y="350503"/>
-            <a:ext cx="2168843" cy="5579096"/>
+            <a:off x="16359187" y="535517"/>
+            <a:ext cx="4929188" cy="8524029"/>
           </a:xfrm>
         </p:spPr>
         <p:txBody>
@@ -531,8 +531,8 @@
         </p:nvSpPr>
         <p:spPr>
           <a:xfrm>
-            <a:off x="691515" y="350503"/>
-            <a:ext cx="6380798" cy="5579096"/>
+            <a:off x="1571625" y="535517"/>
+            <a:ext cx="14501813" cy="8524029"/>
           </a:xfrm>
         </p:spPr>
         <p:txBody>
@@ -593,7 +593,7 @@
           <a:p>
             <a:fld id="{6791DA09-DD71-9144-9C0F-73C0A1D070B2}" type="datetimeFigureOut">
               <a:rPr lang="en-US" smtClean="0"/>
-              <a:t>8/12/22</a:t>
+              <a:t>10/2/23</a:t>
             </a:fld>
             <a:endParaRPr lang="en-US"/>
           </a:p>
@@ -644,7 +644,7 @@
     </p:spTree>
     <p:extLst>
       <p:ext uri="{BB962C8B-B14F-4D97-AF65-F5344CB8AC3E}">
-        <p14:creationId xmlns:p14="http://schemas.microsoft.com/office/powerpoint/2010/main" val="2680362036"/>
+        <p14:creationId xmlns:p14="http://schemas.microsoft.com/office/powerpoint/2010/main" val="683124057"/>
       </p:ext>
     </p:extLst>
   </p:cSld>
@@ -763,7 +763,7 @@
           <a:p>
             <a:fld id="{6791DA09-DD71-9144-9C0F-73C0A1D070B2}" type="datetimeFigureOut">
               <a:rPr lang="en-US" smtClean="0"/>
-              <a:t>8/12/22</a:t>
+              <a:t>10/2/23</a:t>
             </a:fld>
             <a:endParaRPr lang="en-US"/>
           </a:p>
@@ -814,7 +814,7 @@
     </p:spTree>
     <p:extLst>
       <p:ext uri="{BB962C8B-B14F-4D97-AF65-F5344CB8AC3E}">
-        <p14:creationId xmlns:p14="http://schemas.microsoft.com/office/powerpoint/2010/main" val="3672675104"/>
+        <p14:creationId xmlns:p14="http://schemas.microsoft.com/office/powerpoint/2010/main" val="1272007452"/>
       </p:ext>
     </p:extLst>
   </p:cSld>
@@ -853,15 +853,15 @@
         </p:nvSpPr>
         <p:spPr>
           <a:xfrm>
-            <a:off x="686277" y="1641271"/>
-            <a:ext cx="8675370" cy="2738496"/>
+            <a:off x="1559719" y="2507617"/>
+            <a:ext cx="19716750" cy="4184014"/>
           </a:xfrm>
         </p:spPr>
         <p:txBody>
           <a:bodyPr anchor="b"/>
           <a:lstStyle>
             <a:lvl1pPr>
-              <a:defRPr sz="5760"/>
+              <a:defRPr sz="8800"/>
             </a:lvl1pPr>
           </a:lstStyle>
           <a:p>
@@ -885,8 +885,8 @@
         </p:nvSpPr>
         <p:spPr>
           <a:xfrm>
-            <a:off x="686277" y="4405674"/>
-            <a:ext cx="8675370" cy="1440110"/>
+            <a:off x="1559719" y="6731213"/>
+            <a:ext cx="19716750" cy="2200274"/>
           </a:xfrm>
         </p:spPr>
         <p:txBody>
@@ -894,15 +894,17 @@
           <a:lstStyle>
             <a:lvl1pPr marL="0" indent="0">
               <a:buNone/>
-              <a:defRPr sz="2304">
+              <a:defRPr sz="3520">
                 <a:solidFill>
-                  <a:schemeClr val="tx1"/>
+                  <a:schemeClr val="tx1">
+                    <a:tint val="75000"/>
+                  </a:schemeClr>
                 </a:solidFill>
               </a:defRPr>
             </a:lvl1pPr>
-            <a:lvl2pPr marL="438912" indent="0">
+            <a:lvl2pPr marL="670575" indent="0">
               <a:buNone/>
-              <a:defRPr sz="1920">
+              <a:defRPr sz="2933">
                 <a:solidFill>
                   <a:schemeClr val="tx1">
                     <a:tint val="75000"/>
@@ -910,9 +912,9 @@
                 </a:solidFill>
               </a:defRPr>
             </a:lvl2pPr>
-            <a:lvl3pPr marL="877824" indent="0">
+            <a:lvl3pPr marL="1341150" indent="0">
               <a:buNone/>
-              <a:defRPr sz="1728">
+              <a:defRPr sz="2640">
                 <a:solidFill>
                   <a:schemeClr val="tx1">
                     <a:tint val="75000"/>
@@ -920,9 +922,9 @@
                 </a:solidFill>
               </a:defRPr>
             </a:lvl3pPr>
-            <a:lvl4pPr marL="1316736" indent="0">
+            <a:lvl4pPr marL="2011726" indent="0">
               <a:buNone/>
-              <a:defRPr sz="1536">
+              <a:defRPr sz="2347">
                 <a:solidFill>
                   <a:schemeClr val="tx1">
                     <a:tint val="75000"/>
@@ -930,9 +932,9 @@
                 </a:solidFill>
               </a:defRPr>
             </a:lvl4pPr>
-            <a:lvl5pPr marL="1755648" indent="0">
+            <a:lvl5pPr marL="2682301" indent="0">
               <a:buNone/>
-              <a:defRPr sz="1536">
+              <a:defRPr sz="2347">
                 <a:solidFill>
                   <a:schemeClr val="tx1">
                     <a:tint val="75000"/>
@@ -940,9 +942,9 @@
                 </a:solidFill>
               </a:defRPr>
             </a:lvl5pPr>
-            <a:lvl6pPr marL="2194560" indent="0">
+            <a:lvl6pPr marL="3352876" indent="0">
               <a:buNone/>
-              <a:defRPr sz="1536">
+              <a:defRPr sz="2347">
                 <a:solidFill>
                   <a:schemeClr val="tx1">
                     <a:tint val="75000"/>
@@ -950,9 +952,9 @@
                 </a:solidFill>
               </a:defRPr>
             </a:lvl6pPr>
-            <a:lvl7pPr marL="2633472" indent="0">
+            <a:lvl7pPr marL="4023451" indent="0">
               <a:buNone/>
-              <a:defRPr sz="1536">
+              <a:defRPr sz="2347">
                 <a:solidFill>
                   <a:schemeClr val="tx1">
                     <a:tint val="75000"/>
@@ -960,9 +962,9 @@
                 </a:solidFill>
               </a:defRPr>
             </a:lvl7pPr>
-            <a:lvl8pPr marL="3072384" indent="0">
+            <a:lvl8pPr marL="4694027" indent="0">
               <a:buNone/>
-              <a:defRPr sz="1536">
+              <a:defRPr sz="2347">
                 <a:solidFill>
                   <a:schemeClr val="tx1">
                     <a:tint val="75000"/>
@@ -970,9 +972,9 @@
                 </a:solidFill>
               </a:defRPr>
             </a:lvl8pPr>
-            <a:lvl9pPr marL="3511296" indent="0">
+            <a:lvl9pPr marL="5364602" indent="0">
               <a:buNone/>
-              <a:defRPr sz="1536">
+              <a:defRPr sz="2347">
                 <a:solidFill>
                   <a:schemeClr val="tx1">
                     <a:tint val="75000"/>
@@ -1007,7 +1009,7 @@
           <a:p>
             <a:fld id="{6791DA09-DD71-9144-9C0F-73C0A1D070B2}" type="datetimeFigureOut">
               <a:rPr lang="en-US" smtClean="0"/>
-              <a:t>8/12/22</a:t>
+              <a:t>10/2/23</a:t>
             </a:fld>
             <a:endParaRPr lang="en-US"/>
           </a:p>
@@ -1058,7 +1060,7 @@
     </p:spTree>
     <p:extLst>
       <p:ext uri="{BB962C8B-B14F-4D97-AF65-F5344CB8AC3E}">
-        <p14:creationId xmlns:p14="http://schemas.microsoft.com/office/powerpoint/2010/main" val="1763958062"/>
+        <p14:creationId xmlns:p14="http://schemas.microsoft.com/office/powerpoint/2010/main" val="3291496013"/>
       </p:ext>
     </p:extLst>
   </p:cSld>
@@ -1120,8 +1122,8 @@
         </p:nvSpPr>
         <p:spPr>
           <a:xfrm>
-            <a:off x="691515" y="1752516"/>
-            <a:ext cx="4274820" cy="4177083"/>
+            <a:off x="1571625" y="2677584"/>
+            <a:ext cx="9715500" cy="6381962"/>
           </a:xfrm>
         </p:spPr>
         <p:txBody>
@@ -1177,8 +1179,8 @@
         </p:nvSpPr>
         <p:spPr>
           <a:xfrm>
-            <a:off x="5092065" y="1752516"/>
-            <a:ext cx="4274820" cy="4177083"/>
+            <a:off x="11572875" y="2677584"/>
+            <a:ext cx="9715500" cy="6381962"/>
           </a:xfrm>
         </p:spPr>
         <p:txBody>
@@ -1239,7 +1241,7 @@
           <a:p>
             <a:fld id="{6791DA09-DD71-9144-9C0F-73C0A1D070B2}" type="datetimeFigureOut">
               <a:rPr lang="en-US" smtClean="0"/>
-              <a:t>8/12/22</a:t>
+              <a:t>10/2/23</a:t>
             </a:fld>
             <a:endParaRPr lang="en-US"/>
           </a:p>
@@ -1290,7 +1292,7 @@
     </p:spTree>
     <p:extLst>
       <p:ext uri="{BB962C8B-B14F-4D97-AF65-F5344CB8AC3E}">
-        <p14:creationId xmlns:p14="http://schemas.microsoft.com/office/powerpoint/2010/main" val="158414340"/>
+        <p14:creationId xmlns:p14="http://schemas.microsoft.com/office/powerpoint/2010/main" val="3010789375"/>
       </p:ext>
     </p:extLst>
   </p:cSld>
@@ -1329,8 +1331,8 @@
         </p:nvSpPr>
         <p:spPr>
           <a:xfrm>
-            <a:off x="692825" y="350505"/>
-            <a:ext cx="8675370" cy="1272479"/>
+            <a:off x="1574603" y="535517"/>
+            <a:ext cx="19716750" cy="1944159"/>
           </a:xfrm>
         </p:spPr>
         <p:txBody>
@@ -1357,8 +1359,8 @@
         </p:nvSpPr>
         <p:spPr>
           <a:xfrm>
-            <a:off x="692826" y="1613839"/>
-            <a:ext cx="4255174" cy="790917"/>
+            <a:off x="1574603" y="2465706"/>
+            <a:ext cx="9670851" cy="1208404"/>
           </a:xfrm>
         </p:spPr>
         <p:txBody>
@@ -1366,39 +1368,39 @@
           <a:lstStyle>
             <a:lvl1pPr marL="0" indent="0">
               <a:buNone/>
-              <a:defRPr sz="2304" b="1"/>
+              <a:defRPr sz="3520" b="1"/>
             </a:lvl1pPr>
-            <a:lvl2pPr marL="438912" indent="0">
+            <a:lvl2pPr marL="670575" indent="0">
               <a:buNone/>
-              <a:defRPr sz="1920" b="1"/>
+              <a:defRPr sz="2933" b="1"/>
             </a:lvl2pPr>
-            <a:lvl3pPr marL="877824" indent="0">
+            <a:lvl3pPr marL="1341150" indent="0">
               <a:buNone/>
-              <a:defRPr sz="1728" b="1"/>
+              <a:defRPr sz="2640" b="1"/>
             </a:lvl3pPr>
-            <a:lvl4pPr marL="1316736" indent="0">
+            <a:lvl4pPr marL="2011726" indent="0">
               <a:buNone/>
-              <a:defRPr sz="1536" b="1"/>
+              <a:defRPr sz="2347" b="1"/>
             </a:lvl4pPr>
-            <a:lvl5pPr marL="1755648" indent="0">
+            <a:lvl5pPr marL="2682301" indent="0">
               <a:buNone/>
-              <a:defRPr sz="1536" b="1"/>
+              <a:defRPr sz="2347" b="1"/>
             </a:lvl5pPr>
-            <a:lvl6pPr marL="2194560" indent="0">
+            <a:lvl6pPr marL="3352876" indent="0">
               <a:buNone/>
-              <a:defRPr sz="1536" b="1"/>
+              <a:defRPr sz="2347" b="1"/>
             </a:lvl6pPr>
-            <a:lvl7pPr marL="2633472" indent="0">
+            <a:lvl7pPr marL="4023451" indent="0">
               <a:buNone/>
-              <a:defRPr sz="1536" b="1"/>
+              <a:defRPr sz="2347" b="1"/>
             </a:lvl7pPr>
-            <a:lvl8pPr marL="3072384" indent="0">
+            <a:lvl8pPr marL="4694027" indent="0">
               <a:buNone/>
-              <a:defRPr sz="1536" b="1"/>
+              <a:defRPr sz="2347" b="1"/>
             </a:lvl8pPr>
-            <a:lvl9pPr marL="3511296" indent="0">
+            <a:lvl9pPr marL="5364602" indent="0">
               <a:buNone/>
-              <a:defRPr sz="1536" b="1"/>
+              <a:defRPr sz="2347" b="1"/>
             </a:lvl9pPr>
           </a:lstStyle>
           <a:p>
@@ -1422,8 +1424,8 @@
         </p:nvSpPr>
         <p:spPr>
           <a:xfrm>
-            <a:off x="692826" y="2404756"/>
-            <a:ext cx="4255174" cy="3537034"/>
+            <a:off x="1574603" y="3674110"/>
+            <a:ext cx="9670851" cy="5404062"/>
           </a:xfrm>
         </p:spPr>
         <p:txBody>
@@ -1479,8 +1481,8 @@
         </p:nvSpPr>
         <p:spPr>
           <a:xfrm>
-            <a:off x="5092066" y="1613839"/>
-            <a:ext cx="4276130" cy="790917"/>
+            <a:off x="11572875" y="2465706"/>
+            <a:ext cx="9718478" cy="1208404"/>
           </a:xfrm>
         </p:spPr>
         <p:txBody>
@@ -1488,39 +1490,39 @@
           <a:lstStyle>
             <a:lvl1pPr marL="0" indent="0">
               <a:buNone/>
-              <a:defRPr sz="2304" b="1"/>
+              <a:defRPr sz="3520" b="1"/>
             </a:lvl1pPr>
-            <a:lvl2pPr marL="438912" indent="0">
+            <a:lvl2pPr marL="670575" indent="0">
               <a:buNone/>
-              <a:defRPr sz="1920" b="1"/>
+              <a:defRPr sz="2933" b="1"/>
             </a:lvl2pPr>
-            <a:lvl3pPr marL="877824" indent="0">
+            <a:lvl3pPr marL="1341150" indent="0">
               <a:buNone/>
-              <a:defRPr sz="1728" b="1"/>
+              <a:defRPr sz="2640" b="1"/>
             </a:lvl3pPr>
-            <a:lvl4pPr marL="1316736" indent="0">
+            <a:lvl4pPr marL="2011726" indent="0">
               <a:buNone/>
-              <a:defRPr sz="1536" b="1"/>
+              <a:defRPr sz="2347" b="1"/>
             </a:lvl4pPr>
-            <a:lvl5pPr marL="1755648" indent="0">
+            <a:lvl5pPr marL="2682301" indent="0">
               <a:buNone/>
-              <a:defRPr sz="1536" b="1"/>
+              <a:defRPr sz="2347" b="1"/>
             </a:lvl5pPr>
-            <a:lvl6pPr marL="2194560" indent="0">
+            <a:lvl6pPr marL="3352876" indent="0">
               <a:buNone/>
-              <a:defRPr sz="1536" b="1"/>
+              <a:defRPr sz="2347" b="1"/>
             </a:lvl6pPr>
-            <a:lvl7pPr marL="2633472" indent="0">
+            <a:lvl7pPr marL="4023451" indent="0">
               <a:buNone/>
-              <a:defRPr sz="1536" b="1"/>
+              <a:defRPr sz="2347" b="1"/>
             </a:lvl7pPr>
-            <a:lvl8pPr marL="3072384" indent="0">
+            <a:lvl8pPr marL="4694027" indent="0">
               <a:buNone/>
-              <a:defRPr sz="1536" b="1"/>
+              <a:defRPr sz="2347" b="1"/>
             </a:lvl8pPr>
-            <a:lvl9pPr marL="3511296" indent="0">
+            <a:lvl9pPr marL="5364602" indent="0">
               <a:buNone/>
-              <a:defRPr sz="1536" b="1"/>
+              <a:defRPr sz="2347" b="1"/>
             </a:lvl9pPr>
           </a:lstStyle>
           <a:p>
@@ -1544,8 +1546,8 @@
         </p:nvSpPr>
         <p:spPr>
           <a:xfrm>
-            <a:off x="5092066" y="2404756"/>
-            <a:ext cx="4276130" cy="3537034"/>
+            <a:off x="11572875" y="3674110"/>
+            <a:ext cx="9718478" cy="5404062"/>
           </a:xfrm>
         </p:spPr>
         <p:txBody>
@@ -1606,7 +1608,7 @@
           <a:p>
             <a:fld id="{6791DA09-DD71-9144-9C0F-73C0A1D070B2}" type="datetimeFigureOut">
               <a:rPr lang="en-US" smtClean="0"/>
-              <a:t>8/12/22</a:t>
+              <a:t>10/2/23</a:t>
             </a:fld>
             <a:endParaRPr lang="en-US"/>
           </a:p>
@@ -1657,7 +1659,7 @@
     </p:spTree>
     <p:extLst>
       <p:ext uri="{BB962C8B-B14F-4D97-AF65-F5344CB8AC3E}">
-        <p14:creationId xmlns:p14="http://schemas.microsoft.com/office/powerpoint/2010/main" val="4211522289"/>
+        <p14:creationId xmlns:p14="http://schemas.microsoft.com/office/powerpoint/2010/main" val="2636974151"/>
       </p:ext>
     </p:extLst>
   </p:cSld>
@@ -1724,7 +1726,7 @@
           <a:p>
             <a:fld id="{6791DA09-DD71-9144-9C0F-73C0A1D070B2}" type="datetimeFigureOut">
               <a:rPr lang="en-US" smtClean="0"/>
-              <a:t>8/12/22</a:t>
+              <a:t>10/2/23</a:t>
             </a:fld>
             <a:endParaRPr lang="en-US"/>
           </a:p>
@@ -1775,7 +1777,7 @@
     </p:spTree>
     <p:extLst>
       <p:ext uri="{BB962C8B-B14F-4D97-AF65-F5344CB8AC3E}">
-        <p14:creationId xmlns:p14="http://schemas.microsoft.com/office/powerpoint/2010/main" val="2821598627"/>
+        <p14:creationId xmlns:p14="http://schemas.microsoft.com/office/powerpoint/2010/main" val="3465194022"/>
       </p:ext>
     </p:extLst>
   </p:cSld>
@@ -1819,7 +1821,7 @@
           <a:p>
             <a:fld id="{6791DA09-DD71-9144-9C0F-73C0A1D070B2}" type="datetimeFigureOut">
               <a:rPr lang="en-US" smtClean="0"/>
-              <a:t>8/12/22</a:t>
+              <a:t>10/2/23</a:t>
             </a:fld>
             <a:endParaRPr lang="en-US"/>
           </a:p>
@@ -1870,7 +1872,7 @@
     </p:spTree>
     <p:extLst>
       <p:ext uri="{BB962C8B-B14F-4D97-AF65-F5344CB8AC3E}">
-        <p14:creationId xmlns:p14="http://schemas.microsoft.com/office/powerpoint/2010/main" val="59269850"/>
+        <p14:creationId xmlns:p14="http://schemas.microsoft.com/office/powerpoint/2010/main" val="292707343"/>
       </p:ext>
     </p:extLst>
   </p:cSld>
@@ -1909,15 +1911,15 @@
         </p:nvSpPr>
         <p:spPr>
           <a:xfrm>
-            <a:off x="692825" y="438891"/>
-            <a:ext cx="3244096" cy="1536118"/>
+            <a:off x="1574604" y="670560"/>
+            <a:ext cx="7372944" cy="2346960"/>
           </a:xfrm>
         </p:spPr>
         <p:txBody>
           <a:bodyPr anchor="b"/>
           <a:lstStyle>
             <a:lvl1pPr>
-              <a:defRPr sz="3072"/>
+              <a:defRPr sz="4693"/>
             </a:lvl1pPr>
           </a:lstStyle>
           <a:p>
@@ -1941,39 +1943,39 @@
         </p:nvSpPr>
         <p:spPr>
           <a:xfrm>
-            <a:off x="4276130" y="947884"/>
-            <a:ext cx="5092065" cy="4678455"/>
+            <a:off x="9718477" y="1448224"/>
+            <a:ext cx="11572875" cy="7147983"/>
           </a:xfrm>
         </p:spPr>
         <p:txBody>
           <a:bodyPr/>
           <a:lstStyle>
             <a:lvl1pPr>
-              <a:defRPr sz="3072"/>
+              <a:defRPr sz="4693"/>
             </a:lvl1pPr>
             <a:lvl2pPr>
-              <a:defRPr sz="2688"/>
+              <a:defRPr sz="4107"/>
             </a:lvl2pPr>
             <a:lvl3pPr>
-              <a:defRPr sz="2304"/>
+              <a:defRPr sz="3520"/>
             </a:lvl3pPr>
             <a:lvl4pPr>
-              <a:defRPr sz="1920"/>
+              <a:defRPr sz="2933"/>
             </a:lvl4pPr>
             <a:lvl5pPr>
-              <a:defRPr sz="1920"/>
+              <a:defRPr sz="2933"/>
             </a:lvl5pPr>
             <a:lvl6pPr>
-              <a:defRPr sz="1920"/>
+              <a:defRPr sz="2933"/>
             </a:lvl6pPr>
             <a:lvl7pPr>
-              <a:defRPr sz="1920"/>
+              <a:defRPr sz="2933"/>
             </a:lvl7pPr>
             <a:lvl8pPr>
-              <a:defRPr sz="1920"/>
+              <a:defRPr sz="2933"/>
             </a:lvl8pPr>
             <a:lvl9pPr>
-              <a:defRPr sz="1920"/>
+              <a:defRPr sz="2933"/>
             </a:lvl9pPr>
           </a:lstStyle>
           <a:p>
@@ -2026,8 +2028,8 @@
         </p:nvSpPr>
         <p:spPr>
           <a:xfrm>
-            <a:off x="692825" y="1975009"/>
-            <a:ext cx="3244096" cy="3658948"/>
+            <a:off x="1574604" y="3017520"/>
+            <a:ext cx="7372944" cy="5590329"/>
           </a:xfrm>
         </p:spPr>
         <p:txBody>
@@ -2035,39 +2037,39 @@
           <a:lstStyle>
             <a:lvl1pPr marL="0" indent="0">
               <a:buNone/>
-              <a:defRPr sz="1536"/>
+              <a:defRPr sz="2347"/>
             </a:lvl1pPr>
-            <a:lvl2pPr marL="438912" indent="0">
+            <a:lvl2pPr marL="670575" indent="0">
               <a:buNone/>
-              <a:defRPr sz="1344"/>
+              <a:defRPr sz="2053"/>
             </a:lvl2pPr>
-            <a:lvl3pPr marL="877824" indent="0">
+            <a:lvl3pPr marL="1341150" indent="0">
               <a:buNone/>
-              <a:defRPr sz="1152"/>
+              <a:defRPr sz="1760"/>
             </a:lvl3pPr>
-            <a:lvl4pPr marL="1316736" indent="0">
+            <a:lvl4pPr marL="2011726" indent="0">
               <a:buNone/>
-              <a:defRPr sz="960"/>
+              <a:defRPr sz="1467"/>
             </a:lvl4pPr>
-            <a:lvl5pPr marL="1755648" indent="0">
+            <a:lvl5pPr marL="2682301" indent="0">
               <a:buNone/>
-              <a:defRPr sz="960"/>
+              <a:defRPr sz="1467"/>
             </a:lvl5pPr>
-            <a:lvl6pPr marL="2194560" indent="0">
+            <a:lvl6pPr marL="3352876" indent="0">
               <a:buNone/>
-              <a:defRPr sz="960"/>
+              <a:defRPr sz="1467"/>
             </a:lvl6pPr>
-            <a:lvl7pPr marL="2633472" indent="0">
+            <a:lvl7pPr marL="4023451" indent="0">
               <a:buNone/>
-              <a:defRPr sz="960"/>
+              <a:defRPr sz="1467"/>
             </a:lvl7pPr>
-            <a:lvl8pPr marL="3072384" indent="0">
+            <a:lvl8pPr marL="4694027" indent="0">
               <a:buNone/>
-              <a:defRPr sz="960"/>
+              <a:defRPr sz="1467"/>
             </a:lvl8pPr>
-            <a:lvl9pPr marL="3511296" indent="0">
+            <a:lvl9pPr marL="5364602" indent="0">
               <a:buNone/>
-              <a:defRPr sz="960"/>
+              <a:defRPr sz="1467"/>
             </a:lvl9pPr>
           </a:lstStyle>
           <a:p>
@@ -2096,7 +2098,7 @@
           <a:p>
             <a:fld id="{6791DA09-DD71-9144-9C0F-73C0A1D070B2}" type="datetimeFigureOut">
               <a:rPr lang="en-US" smtClean="0"/>
-              <a:t>8/12/22</a:t>
+              <a:t>10/2/23</a:t>
             </a:fld>
             <a:endParaRPr lang="en-US"/>
           </a:p>
@@ -2147,7 +2149,7 @@
     </p:spTree>
     <p:extLst>
       <p:ext uri="{BB962C8B-B14F-4D97-AF65-F5344CB8AC3E}">
-        <p14:creationId xmlns:p14="http://schemas.microsoft.com/office/powerpoint/2010/main" val="3415035263"/>
+        <p14:creationId xmlns:p14="http://schemas.microsoft.com/office/powerpoint/2010/main" val="2327600317"/>
       </p:ext>
     </p:extLst>
   </p:cSld>
@@ -2186,15 +2188,15 @@
         </p:nvSpPr>
         <p:spPr>
           <a:xfrm>
-            <a:off x="692825" y="438891"/>
-            <a:ext cx="3244096" cy="1536118"/>
+            <a:off x="1574604" y="670560"/>
+            <a:ext cx="7372944" cy="2346960"/>
           </a:xfrm>
         </p:spPr>
         <p:txBody>
           <a:bodyPr anchor="b"/>
           <a:lstStyle>
             <a:lvl1pPr>
-              <a:defRPr sz="3072"/>
+              <a:defRPr sz="4693"/>
             </a:lvl1pPr>
           </a:lstStyle>
           <a:p>
@@ -2218,8 +2220,8 @@
         </p:nvSpPr>
         <p:spPr>
           <a:xfrm>
-            <a:off x="4276130" y="947884"/>
-            <a:ext cx="5092065" cy="4678455"/>
+            <a:off x="9718477" y="1448224"/>
+            <a:ext cx="11572875" cy="7147983"/>
           </a:xfrm>
         </p:spPr>
         <p:txBody>
@@ -2227,39 +2229,39 @@
           <a:lstStyle>
             <a:lvl1pPr marL="0" indent="0">
               <a:buNone/>
-              <a:defRPr sz="3072"/>
+              <a:defRPr sz="4693"/>
             </a:lvl1pPr>
-            <a:lvl2pPr marL="438912" indent="0">
+            <a:lvl2pPr marL="670575" indent="0">
               <a:buNone/>
-              <a:defRPr sz="2688"/>
+              <a:defRPr sz="4107"/>
             </a:lvl2pPr>
-            <a:lvl3pPr marL="877824" indent="0">
+            <a:lvl3pPr marL="1341150" indent="0">
               <a:buNone/>
-              <a:defRPr sz="2304"/>
+              <a:defRPr sz="3520"/>
             </a:lvl3pPr>
-            <a:lvl4pPr marL="1316736" indent="0">
+            <a:lvl4pPr marL="2011726" indent="0">
               <a:buNone/>
-              <a:defRPr sz="1920"/>
+              <a:defRPr sz="2933"/>
             </a:lvl4pPr>
-            <a:lvl5pPr marL="1755648" indent="0">
+            <a:lvl5pPr marL="2682301" indent="0">
               <a:buNone/>
-              <a:defRPr sz="1920"/>
+              <a:defRPr sz="2933"/>
             </a:lvl5pPr>
-            <a:lvl6pPr marL="2194560" indent="0">
+            <a:lvl6pPr marL="3352876" indent="0">
               <a:buNone/>
-              <a:defRPr sz="1920"/>
+              <a:defRPr sz="2933"/>
             </a:lvl6pPr>
-            <a:lvl7pPr marL="2633472" indent="0">
+            <a:lvl7pPr marL="4023451" indent="0">
               <a:buNone/>
-              <a:defRPr sz="1920"/>
+              <a:defRPr sz="2933"/>
             </a:lvl7pPr>
-            <a:lvl8pPr marL="3072384" indent="0">
+            <a:lvl8pPr marL="4694027" indent="0">
               <a:buNone/>
-              <a:defRPr sz="1920"/>
+              <a:defRPr sz="2933"/>
             </a:lvl8pPr>
-            <a:lvl9pPr marL="3511296" indent="0">
+            <a:lvl9pPr marL="5364602" indent="0">
               <a:buNone/>
-              <a:defRPr sz="1920"/>
+              <a:defRPr sz="2933"/>
             </a:lvl9pPr>
           </a:lstStyle>
           <a:p>
@@ -2283,8 +2285,8 @@
         </p:nvSpPr>
         <p:spPr>
           <a:xfrm>
-            <a:off x="692825" y="1975009"/>
-            <a:ext cx="3244096" cy="3658948"/>
+            <a:off x="1574604" y="3017520"/>
+            <a:ext cx="7372944" cy="5590329"/>
           </a:xfrm>
         </p:spPr>
         <p:txBody>
@@ -2292,39 +2294,39 @@
           <a:lstStyle>
             <a:lvl1pPr marL="0" indent="0">
               <a:buNone/>
-              <a:defRPr sz="1536"/>
+              <a:defRPr sz="2347"/>
             </a:lvl1pPr>
-            <a:lvl2pPr marL="438912" indent="0">
+            <a:lvl2pPr marL="670575" indent="0">
               <a:buNone/>
-              <a:defRPr sz="1344"/>
+              <a:defRPr sz="2053"/>
             </a:lvl2pPr>
-            <a:lvl3pPr marL="877824" indent="0">
+            <a:lvl3pPr marL="1341150" indent="0">
               <a:buNone/>
-              <a:defRPr sz="1152"/>
+              <a:defRPr sz="1760"/>
             </a:lvl3pPr>
-            <a:lvl4pPr marL="1316736" indent="0">
+            <a:lvl4pPr marL="2011726" indent="0">
               <a:buNone/>
-              <a:defRPr sz="960"/>
+              <a:defRPr sz="1467"/>
             </a:lvl4pPr>
-            <a:lvl5pPr marL="1755648" indent="0">
+            <a:lvl5pPr marL="2682301" indent="0">
               <a:buNone/>
-              <a:defRPr sz="960"/>
+              <a:defRPr sz="1467"/>
             </a:lvl5pPr>
-            <a:lvl6pPr marL="2194560" indent="0">
+            <a:lvl6pPr marL="3352876" indent="0">
               <a:buNone/>
-              <a:defRPr sz="960"/>
+              <a:defRPr sz="1467"/>
             </a:lvl6pPr>
-            <a:lvl7pPr marL="2633472" indent="0">
+            <a:lvl7pPr marL="4023451" indent="0">
               <a:buNone/>
-              <a:defRPr sz="960"/>
+              <a:defRPr sz="1467"/>
             </a:lvl7pPr>
-            <a:lvl8pPr marL="3072384" indent="0">
+            <a:lvl8pPr marL="4694027" indent="0">
               <a:buNone/>
-              <a:defRPr sz="960"/>
+              <a:defRPr sz="1467"/>
             </a:lvl8pPr>
-            <a:lvl9pPr marL="3511296" indent="0">
+            <a:lvl9pPr marL="5364602" indent="0">
               <a:buNone/>
-              <a:defRPr sz="960"/>
+              <a:defRPr sz="1467"/>
             </a:lvl9pPr>
           </a:lstStyle>
           <a:p>
@@ -2353,7 +2355,7 @@
           <a:p>
             <a:fld id="{6791DA09-DD71-9144-9C0F-73C0A1D070B2}" type="datetimeFigureOut">
               <a:rPr lang="en-US" smtClean="0"/>
-              <a:t>8/12/22</a:t>
+              <a:t>10/2/23</a:t>
             </a:fld>
             <a:endParaRPr lang="en-US"/>
           </a:p>
@@ -2404,7 +2406,7 @@
     </p:spTree>
     <p:extLst>
       <p:ext uri="{BB962C8B-B14F-4D97-AF65-F5344CB8AC3E}">
-        <p14:creationId xmlns:p14="http://schemas.microsoft.com/office/powerpoint/2010/main" val="3253795278"/>
+        <p14:creationId xmlns:p14="http://schemas.microsoft.com/office/powerpoint/2010/main" val="4276569127"/>
       </p:ext>
     </p:extLst>
   </p:cSld>
@@ -2448,8 +2450,8 @@
         </p:nvSpPr>
         <p:spPr>
           <a:xfrm>
-            <a:off x="691515" y="350505"/>
-            <a:ext cx="8675370" cy="1272479"/>
+            <a:off x="1571625" y="535517"/>
+            <a:ext cx="19716750" cy="1944159"/>
           </a:xfrm>
           <a:prstGeom prst="rect">
             <a:avLst/>
@@ -2481,8 +2483,8 @@
         </p:nvSpPr>
         <p:spPr>
           <a:xfrm>
-            <a:off x="691515" y="1752516"/>
-            <a:ext cx="8675370" cy="4177083"/>
+            <a:off x="1571625" y="2677584"/>
+            <a:ext cx="19716750" cy="6381962"/>
           </a:xfrm>
           <a:prstGeom prst="rect">
             <a:avLst/>
@@ -2543,8 +2545,8 @@
         </p:nvSpPr>
         <p:spPr>
           <a:xfrm>
-            <a:off x="691515" y="6101804"/>
-            <a:ext cx="2263140" cy="350503"/>
+            <a:off x="1571625" y="9322647"/>
+            <a:ext cx="5143500" cy="535517"/>
           </a:xfrm>
           <a:prstGeom prst="rect">
             <a:avLst/>
@@ -2554,7 +2556,7 @@
           <a:bodyPr vert="horz" lIns="91440" tIns="45720" rIns="91440" bIns="45720" rtlCol="0" anchor="ctr"/>
           <a:lstStyle>
             <a:lvl1pPr algn="l">
-              <a:defRPr sz="1152">
+              <a:defRPr sz="1760">
                 <a:solidFill>
                   <a:schemeClr val="tx1">
                     <a:tint val="75000"/>
@@ -2566,7 +2568,7 @@
           <a:p>
             <a:fld id="{6791DA09-DD71-9144-9C0F-73C0A1D070B2}" type="datetimeFigureOut">
               <a:rPr lang="en-US" smtClean="0"/>
-              <a:t>8/12/22</a:t>
+              <a:t>10/2/23</a:t>
             </a:fld>
             <a:endParaRPr lang="en-US"/>
           </a:p>
@@ -2584,8 +2586,8 @@
         </p:nvSpPr>
         <p:spPr>
           <a:xfrm>
-            <a:off x="3331845" y="6101804"/>
-            <a:ext cx="3394710" cy="350503"/>
+            <a:off x="7572375" y="9322647"/>
+            <a:ext cx="7715250" cy="535517"/>
           </a:xfrm>
           <a:prstGeom prst="rect">
             <a:avLst/>
@@ -2595,7 +2597,7 @@
           <a:bodyPr vert="horz" lIns="91440" tIns="45720" rIns="91440" bIns="45720" rtlCol="0" anchor="ctr"/>
           <a:lstStyle>
             <a:lvl1pPr algn="ctr">
-              <a:defRPr sz="1152">
+              <a:defRPr sz="1760">
                 <a:solidFill>
                   <a:schemeClr val="tx1">
                     <a:tint val="75000"/>
@@ -2621,8 +2623,8 @@
         </p:nvSpPr>
         <p:spPr>
           <a:xfrm>
-            <a:off x="7103745" y="6101804"/>
-            <a:ext cx="2263140" cy="350503"/>
+            <a:off x="16144875" y="9322647"/>
+            <a:ext cx="5143500" cy="535517"/>
           </a:xfrm>
           <a:prstGeom prst="rect">
             <a:avLst/>
@@ -2632,7 +2634,7 @@
           <a:bodyPr vert="horz" lIns="91440" tIns="45720" rIns="91440" bIns="45720" rtlCol="0" anchor="ctr"/>
           <a:lstStyle>
             <a:lvl1pPr algn="r">
-              <a:defRPr sz="1152">
+              <a:defRPr sz="1760">
                 <a:solidFill>
                   <a:schemeClr val="tx1">
                     <a:tint val="75000"/>
@@ -2653,27 +2655,27 @@
     </p:spTree>
     <p:extLst>
       <p:ext uri="{BB962C8B-B14F-4D97-AF65-F5344CB8AC3E}">
-        <p14:creationId xmlns:p14="http://schemas.microsoft.com/office/powerpoint/2010/main" val="2354009283"/>
+        <p14:creationId xmlns:p14="http://schemas.microsoft.com/office/powerpoint/2010/main" val="176459126"/>
       </p:ext>
     </p:extLst>
   </p:cSld>
   <p:clrMap bg1="lt1" tx1="dk1" bg2="lt2" tx2="dk2" accent1="accent1" accent2="accent2" accent3="accent3" accent4="accent4" accent5="accent5" accent6="accent6" hlink="hlink" folHlink="folHlink"/>
   <p:sldLayoutIdLst>
-    <p:sldLayoutId id="2147483733" r:id="rId1"/>
-    <p:sldLayoutId id="2147483734" r:id="rId2"/>
-    <p:sldLayoutId id="2147483735" r:id="rId3"/>
-    <p:sldLayoutId id="2147483736" r:id="rId4"/>
-    <p:sldLayoutId id="2147483737" r:id="rId5"/>
-    <p:sldLayoutId id="2147483738" r:id="rId6"/>
-    <p:sldLayoutId id="2147483739" r:id="rId7"/>
-    <p:sldLayoutId id="2147483740" r:id="rId8"/>
-    <p:sldLayoutId id="2147483741" r:id="rId9"/>
-    <p:sldLayoutId id="2147483742" r:id="rId10"/>
-    <p:sldLayoutId id="2147483743" r:id="rId11"/>
+    <p:sldLayoutId id="2147483769" r:id="rId1"/>
+    <p:sldLayoutId id="2147483770" r:id="rId2"/>
+    <p:sldLayoutId id="2147483771" r:id="rId3"/>
+    <p:sldLayoutId id="2147483772" r:id="rId4"/>
+    <p:sldLayoutId id="2147483773" r:id="rId5"/>
+    <p:sldLayoutId id="2147483774" r:id="rId6"/>
+    <p:sldLayoutId id="2147483775" r:id="rId7"/>
+    <p:sldLayoutId id="2147483776" r:id="rId8"/>
+    <p:sldLayoutId id="2147483777" r:id="rId9"/>
+    <p:sldLayoutId id="2147483778" r:id="rId10"/>
+    <p:sldLayoutId id="2147483779" r:id="rId11"/>
   </p:sldLayoutIdLst>
   <p:txStyles>
     <p:titleStyle>
-      <a:lvl1pPr algn="l" defTabSz="877824" rtl="0" eaLnBrk="1" latinLnBrk="0" hangingPunct="1">
+      <a:lvl1pPr algn="l" defTabSz="1341150" rtl="0" eaLnBrk="1" latinLnBrk="0" hangingPunct="1">
         <a:lnSpc>
           <a:spcPct val="90000"/>
         </a:lnSpc>
@@ -2681,7 +2683,7 @@
           <a:spcPct val="0"/>
         </a:spcBef>
         <a:buNone/>
-        <a:defRPr sz="4224" kern="1200">
+        <a:defRPr sz="6453" kern="1200">
           <a:solidFill>
             <a:schemeClr val="tx1"/>
           </a:solidFill>
@@ -2692,16 +2694,16 @@
       </a:lvl1pPr>
     </p:titleStyle>
     <p:bodyStyle>
-      <a:lvl1pPr marL="219456" indent="-219456" algn="l" defTabSz="877824" rtl="0" eaLnBrk="1" latinLnBrk="0" hangingPunct="1">
+      <a:lvl1pPr marL="335288" indent="-335288" algn="l" defTabSz="1341150" rtl="0" eaLnBrk="1" latinLnBrk="0" hangingPunct="1">
         <a:lnSpc>
           <a:spcPct val="90000"/>
         </a:lnSpc>
         <a:spcBef>
-          <a:spcPts val="960"/>
+          <a:spcPts val="1467"/>
         </a:spcBef>
         <a:buFont typeface="Arial" panose="020B0604020202020204" pitchFamily="34" charset="0"/>
         <a:buChar char="•"/>
-        <a:defRPr sz="2688" kern="1200">
+        <a:defRPr sz="4107" kern="1200">
           <a:solidFill>
             <a:schemeClr val="tx1"/>
           </a:solidFill>
@@ -2710,16 +2712,16 @@
           <a:cs typeface="+mn-cs"/>
         </a:defRPr>
       </a:lvl1pPr>
-      <a:lvl2pPr marL="658368" indent="-219456" algn="l" defTabSz="877824" rtl="0" eaLnBrk="1" latinLnBrk="0" hangingPunct="1">
+      <a:lvl2pPr marL="1005863" indent="-335288" algn="l" defTabSz="1341150" rtl="0" eaLnBrk="1" latinLnBrk="0" hangingPunct="1">
         <a:lnSpc>
           <a:spcPct val="90000"/>
         </a:lnSpc>
         <a:spcBef>
-          <a:spcPts val="480"/>
+          <a:spcPts val="733"/>
         </a:spcBef>
         <a:buFont typeface="Arial" panose="020B0604020202020204" pitchFamily="34" charset="0"/>
         <a:buChar char="•"/>
-        <a:defRPr sz="2304" kern="1200">
+        <a:defRPr sz="3520" kern="1200">
           <a:solidFill>
             <a:schemeClr val="tx1"/>
           </a:solidFill>
@@ -2728,16 +2730,16 @@
           <a:cs typeface="+mn-cs"/>
         </a:defRPr>
       </a:lvl2pPr>
-      <a:lvl3pPr marL="1097280" indent="-219456" algn="l" defTabSz="877824" rtl="0" eaLnBrk="1" latinLnBrk="0" hangingPunct="1">
+      <a:lvl3pPr marL="1676438" indent="-335288" algn="l" defTabSz="1341150" rtl="0" eaLnBrk="1" latinLnBrk="0" hangingPunct="1">
         <a:lnSpc>
           <a:spcPct val="90000"/>
         </a:lnSpc>
         <a:spcBef>
-          <a:spcPts val="480"/>
+          <a:spcPts val="733"/>
         </a:spcBef>
         <a:buFont typeface="Arial" panose="020B0604020202020204" pitchFamily="34" charset="0"/>
         <a:buChar char="•"/>
-        <a:defRPr sz="1920" kern="1200">
+        <a:defRPr sz="2933" kern="1200">
           <a:solidFill>
             <a:schemeClr val="tx1"/>
           </a:solidFill>
@@ -2746,16 +2748,16 @@
           <a:cs typeface="+mn-cs"/>
         </a:defRPr>
       </a:lvl3pPr>
-      <a:lvl4pPr marL="1536192" indent="-219456" algn="l" defTabSz="877824" rtl="0" eaLnBrk="1" latinLnBrk="0" hangingPunct="1">
+      <a:lvl4pPr marL="2347013" indent="-335288" algn="l" defTabSz="1341150" rtl="0" eaLnBrk="1" latinLnBrk="0" hangingPunct="1">
         <a:lnSpc>
           <a:spcPct val="90000"/>
         </a:lnSpc>
         <a:spcBef>
-          <a:spcPts val="480"/>
+          <a:spcPts val="733"/>
         </a:spcBef>
         <a:buFont typeface="Arial" panose="020B0604020202020204" pitchFamily="34" charset="0"/>
         <a:buChar char="•"/>
-        <a:defRPr sz="1728" kern="1200">
+        <a:defRPr sz="2640" kern="1200">
           <a:solidFill>
             <a:schemeClr val="tx1"/>
           </a:solidFill>
@@ -2764,16 +2766,16 @@
           <a:cs typeface="+mn-cs"/>
         </a:defRPr>
       </a:lvl4pPr>
-      <a:lvl5pPr marL="1975104" indent="-219456" algn="l" defTabSz="877824" rtl="0" eaLnBrk="1" latinLnBrk="0" hangingPunct="1">
+      <a:lvl5pPr marL="3017589" indent="-335288" algn="l" defTabSz="1341150" rtl="0" eaLnBrk="1" latinLnBrk="0" hangingPunct="1">
         <a:lnSpc>
           <a:spcPct val="90000"/>
         </a:lnSpc>
         <a:spcBef>
-          <a:spcPts val="480"/>
+          <a:spcPts val="733"/>
         </a:spcBef>
         <a:buFont typeface="Arial" panose="020B0604020202020204" pitchFamily="34" charset="0"/>
         <a:buChar char="•"/>
-        <a:defRPr sz="1728" kern="1200">
+        <a:defRPr sz="2640" kern="1200">
           <a:solidFill>
             <a:schemeClr val="tx1"/>
           </a:solidFill>
@@ -2782,16 +2784,16 @@
           <a:cs typeface="+mn-cs"/>
         </a:defRPr>
       </a:lvl5pPr>
-      <a:lvl6pPr marL="2414016" indent="-219456" algn="l" defTabSz="877824" rtl="0" eaLnBrk="1" latinLnBrk="0" hangingPunct="1">
+      <a:lvl6pPr marL="3688164" indent="-335288" algn="l" defTabSz="1341150" rtl="0" eaLnBrk="1" latinLnBrk="0" hangingPunct="1">
         <a:lnSpc>
           <a:spcPct val="90000"/>
         </a:lnSpc>
         <a:spcBef>
-          <a:spcPts val="480"/>
+          <a:spcPts val="733"/>
         </a:spcBef>
         <a:buFont typeface="Arial" panose="020B0604020202020204" pitchFamily="34" charset="0"/>
         <a:buChar char="•"/>
-        <a:defRPr sz="1728" kern="1200">
+        <a:defRPr sz="2640" kern="1200">
           <a:solidFill>
             <a:schemeClr val="tx1"/>
           </a:solidFill>
@@ -2800,16 +2802,16 @@
           <a:cs typeface="+mn-cs"/>
         </a:defRPr>
       </a:lvl6pPr>
-      <a:lvl7pPr marL="2852928" indent="-219456" algn="l" defTabSz="877824" rtl="0" eaLnBrk="1" latinLnBrk="0" hangingPunct="1">
+      <a:lvl7pPr marL="4358739" indent="-335288" algn="l" defTabSz="1341150" rtl="0" eaLnBrk="1" latinLnBrk="0" hangingPunct="1">
         <a:lnSpc>
           <a:spcPct val="90000"/>
         </a:lnSpc>
         <a:spcBef>
-          <a:spcPts val="480"/>
+          <a:spcPts val="733"/>
         </a:spcBef>
         <a:buFont typeface="Arial" panose="020B0604020202020204" pitchFamily="34" charset="0"/>
         <a:buChar char="•"/>
-        <a:defRPr sz="1728" kern="1200">
+        <a:defRPr sz="2640" kern="1200">
           <a:solidFill>
             <a:schemeClr val="tx1"/>
           </a:solidFill>
@@ -2818,16 +2820,16 @@
           <a:cs typeface="+mn-cs"/>
         </a:defRPr>
       </a:lvl7pPr>
-      <a:lvl8pPr marL="3291840" indent="-219456" algn="l" defTabSz="877824" rtl="0" eaLnBrk="1" latinLnBrk="0" hangingPunct="1">
+      <a:lvl8pPr marL="5029314" indent="-335288" algn="l" defTabSz="1341150" rtl="0" eaLnBrk="1" latinLnBrk="0" hangingPunct="1">
         <a:lnSpc>
           <a:spcPct val="90000"/>
         </a:lnSpc>
         <a:spcBef>
-          <a:spcPts val="480"/>
+          <a:spcPts val="733"/>
         </a:spcBef>
         <a:buFont typeface="Arial" panose="020B0604020202020204" pitchFamily="34" charset="0"/>
         <a:buChar char="•"/>
-        <a:defRPr sz="1728" kern="1200">
+        <a:defRPr sz="2640" kern="1200">
           <a:solidFill>
             <a:schemeClr val="tx1"/>
           </a:solidFill>
@@ -2836,16 +2838,16 @@
           <a:cs typeface="+mn-cs"/>
         </a:defRPr>
       </a:lvl8pPr>
-      <a:lvl9pPr marL="3730752" indent="-219456" algn="l" defTabSz="877824" rtl="0" eaLnBrk="1" latinLnBrk="0" hangingPunct="1">
+      <a:lvl9pPr marL="5699890" indent="-335288" algn="l" defTabSz="1341150" rtl="0" eaLnBrk="1" latinLnBrk="0" hangingPunct="1">
         <a:lnSpc>
           <a:spcPct val="90000"/>
         </a:lnSpc>
         <a:spcBef>
-          <a:spcPts val="480"/>
+          <a:spcPts val="733"/>
         </a:spcBef>
         <a:buFont typeface="Arial" panose="020B0604020202020204" pitchFamily="34" charset="0"/>
         <a:buChar char="•"/>
-        <a:defRPr sz="1728" kern="1200">
+        <a:defRPr sz="2640" kern="1200">
           <a:solidFill>
             <a:schemeClr val="tx1"/>
           </a:solidFill>
@@ -2859,8 +2861,8 @@
       <a:defPPr>
         <a:defRPr lang="en-US"/>
       </a:defPPr>
-      <a:lvl1pPr marL="0" algn="l" defTabSz="877824" rtl="0" eaLnBrk="1" latinLnBrk="0" hangingPunct="1">
-        <a:defRPr sz="1728" kern="1200">
+      <a:lvl1pPr marL="0" algn="l" defTabSz="1341150" rtl="0" eaLnBrk="1" latinLnBrk="0" hangingPunct="1">
+        <a:defRPr sz="2640" kern="1200">
           <a:solidFill>
             <a:schemeClr val="tx1"/>
           </a:solidFill>
@@ -2869,8 +2871,8 @@
           <a:cs typeface="+mn-cs"/>
         </a:defRPr>
       </a:lvl1pPr>
-      <a:lvl2pPr marL="438912" algn="l" defTabSz="877824" rtl="0" eaLnBrk="1" latinLnBrk="0" hangingPunct="1">
-        <a:defRPr sz="1728" kern="1200">
+      <a:lvl2pPr marL="670575" algn="l" defTabSz="1341150" rtl="0" eaLnBrk="1" latinLnBrk="0" hangingPunct="1">
+        <a:defRPr sz="2640" kern="1200">
           <a:solidFill>
             <a:schemeClr val="tx1"/>
           </a:solidFill>
@@ -2879,8 +2881,8 @@
           <a:cs typeface="+mn-cs"/>
         </a:defRPr>
       </a:lvl2pPr>
-      <a:lvl3pPr marL="877824" algn="l" defTabSz="877824" rtl="0" eaLnBrk="1" latinLnBrk="0" hangingPunct="1">
-        <a:defRPr sz="1728" kern="1200">
+      <a:lvl3pPr marL="1341150" algn="l" defTabSz="1341150" rtl="0" eaLnBrk="1" latinLnBrk="0" hangingPunct="1">
+        <a:defRPr sz="2640" kern="1200">
           <a:solidFill>
             <a:schemeClr val="tx1"/>
           </a:solidFill>
@@ -2889,8 +2891,8 @@
           <a:cs typeface="+mn-cs"/>
         </a:defRPr>
       </a:lvl3pPr>
-      <a:lvl4pPr marL="1316736" algn="l" defTabSz="877824" rtl="0" eaLnBrk="1" latinLnBrk="0" hangingPunct="1">
-        <a:defRPr sz="1728" kern="1200">
+      <a:lvl4pPr marL="2011726" algn="l" defTabSz="1341150" rtl="0" eaLnBrk="1" latinLnBrk="0" hangingPunct="1">
+        <a:defRPr sz="2640" kern="1200">
           <a:solidFill>
             <a:schemeClr val="tx1"/>
           </a:solidFill>
@@ -2899,8 +2901,8 @@
           <a:cs typeface="+mn-cs"/>
         </a:defRPr>
       </a:lvl4pPr>
-      <a:lvl5pPr marL="1755648" algn="l" defTabSz="877824" rtl="0" eaLnBrk="1" latinLnBrk="0" hangingPunct="1">
-        <a:defRPr sz="1728" kern="1200">
+      <a:lvl5pPr marL="2682301" algn="l" defTabSz="1341150" rtl="0" eaLnBrk="1" latinLnBrk="0" hangingPunct="1">
+        <a:defRPr sz="2640" kern="1200">
           <a:solidFill>
             <a:schemeClr val="tx1"/>
           </a:solidFill>
@@ -2909,8 +2911,8 @@
           <a:cs typeface="+mn-cs"/>
         </a:defRPr>
       </a:lvl5pPr>
-      <a:lvl6pPr marL="2194560" algn="l" defTabSz="877824" rtl="0" eaLnBrk="1" latinLnBrk="0" hangingPunct="1">
-        <a:defRPr sz="1728" kern="1200">
+      <a:lvl6pPr marL="3352876" algn="l" defTabSz="1341150" rtl="0" eaLnBrk="1" latinLnBrk="0" hangingPunct="1">
+        <a:defRPr sz="2640" kern="1200">
           <a:solidFill>
             <a:schemeClr val="tx1"/>
           </a:solidFill>
@@ -2919,8 +2921,8 @@
           <a:cs typeface="+mn-cs"/>
         </a:defRPr>
       </a:lvl6pPr>
-      <a:lvl7pPr marL="2633472" algn="l" defTabSz="877824" rtl="0" eaLnBrk="1" latinLnBrk="0" hangingPunct="1">
-        <a:defRPr sz="1728" kern="1200">
+      <a:lvl7pPr marL="4023451" algn="l" defTabSz="1341150" rtl="0" eaLnBrk="1" latinLnBrk="0" hangingPunct="1">
+        <a:defRPr sz="2640" kern="1200">
           <a:solidFill>
             <a:schemeClr val="tx1"/>
           </a:solidFill>
@@ -2929,8 +2931,8 @@
           <a:cs typeface="+mn-cs"/>
         </a:defRPr>
       </a:lvl7pPr>
-      <a:lvl8pPr marL="3072384" algn="l" defTabSz="877824" rtl="0" eaLnBrk="1" latinLnBrk="0" hangingPunct="1">
-        <a:defRPr sz="1728" kern="1200">
+      <a:lvl8pPr marL="4694027" algn="l" defTabSz="1341150" rtl="0" eaLnBrk="1" latinLnBrk="0" hangingPunct="1">
+        <a:defRPr sz="2640" kern="1200">
           <a:solidFill>
             <a:schemeClr val="tx1"/>
           </a:solidFill>
@@ -2939,8 +2941,8 @@
           <a:cs typeface="+mn-cs"/>
         </a:defRPr>
       </a:lvl8pPr>
-      <a:lvl9pPr marL="3511296" algn="l" defTabSz="877824" rtl="0" eaLnBrk="1" latinLnBrk="0" hangingPunct="1">
-        <a:defRPr sz="1728" kern="1200">
+      <a:lvl9pPr marL="5364602" algn="l" defTabSz="1341150" rtl="0" eaLnBrk="1" latinLnBrk="0" hangingPunct="1">
+        <a:defRPr sz="2640" kern="1200">
           <a:solidFill>
             <a:schemeClr val="tx1"/>
           </a:solidFill>
@@ -2973,10 +2975,10 @@
       </p:grpSpPr>
       <p:grpSp>
         <p:nvGrpSpPr>
-          <p:cNvPr id="211" name="Group 210">
+          <p:cNvPr id="160" name="Group 159">
             <a:extLst>
               <a:ext uri="{FF2B5EF4-FFF2-40B4-BE49-F238E27FC236}">
-                <a16:creationId xmlns:a16="http://schemas.microsoft.com/office/drawing/2014/main" id="{010B6901-6538-7E4D-BD20-D3610A452E4A}"/>
+                <a16:creationId xmlns:a16="http://schemas.microsoft.com/office/drawing/2014/main" id="{E1889B4F-F125-0147-953C-8BC61ECF29FB}"/>
               </a:ext>
             </a:extLst>
           </p:cNvPr>
@@ -2993,10 +2995,10 @@
         </p:grpSpPr>
         <p:cxnSp>
           <p:nvCxnSpPr>
-            <p:cNvPr id="212" name="Straight Connector 211">
+            <p:cNvPr id="161" name="Straight Connector 160">
               <a:extLst>
                 <a:ext uri="{FF2B5EF4-FFF2-40B4-BE49-F238E27FC236}">
-                  <a16:creationId xmlns:a16="http://schemas.microsoft.com/office/drawing/2014/main" id="{FDB04F40-8CCE-2C43-A3BE-E236F0E351D4}"/>
+                  <a16:creationId xmlns:a16="http://schemas.microsoft.com/office/drawing/2014/main" id="{B2BBF9E2-F462-E443-A66F-F3F4B89410F7}"/>
                 </a:ext>
               </a:extLst>
             </p:cNvPr>
@@ -3036,10 +3038,10 @@
         </p:cxnSp>
         <p:sp>
           <p:nvSpPr>
-            <p:cNvPr id="213" name="Right Arrow 212">
+            <p:cNvPr id="162" name="Right Arrow 161">
               <a:extLst>
                 <a:ext uri="{FF2B5EF4-FFF2-40B4-BE49-F238E27FC236}">
-                  <a16:creationId xmlns:a16="http://schemas.microsoft.com/office/drawing/2014/main" id="{0EF6A7CA-2C05-4D44-AD7E-D371EEC815E6}"/>
+                  <a16:creationId xmlns:a16="http://schemas.microsoft.com/office/drawing/2014/main" id="{173A94D2-FBBD-114B-8065-8D9284A29007}"/>
                 </a:ext>
               </a:extLst>
             </p:cNvPr>
@@ -3086,10 +3088,10 @@
         </p:sp>
         <p:sp>
           <p:nvSpPr>
-            <p:cNvPr id="214" name="Rectangle 213">
+            <p:cNvPr id="163" name="Rectangle 162">
               <a:extLst>
                 <a:ext uri="{FF2B5EF4-FFF2-40B4-BE49-F238E27FC236}">
-                  <a16:creationId xmlns:a16="http://schemas.microsoft.com/office/drawing/2014/main" id="{6143D58C-5CA2-5844-960A-8B179A1D5059}"/>
+                  <a16:creationId xmlns:a16="http://schemas.microsoft.com/office/drawing/2014/main" id="{3C7BD155-1D73-9247-A2E3-6F1217AAA26E}"/>
                 </a:ext>
               </a:extLst>
             </p:cNvPr>
@@ -3137,10 +3139,10 @@
       </p:grpSp>
       <p:sp>
         <p:nvSpPr>
-          <p:cNvPr id="215" name="TextBox 214">
+          <p:cNvPr id="164" name="TextBox 163">
             <a:extLst>
               <a:ext uri="{FF2B5EF4-FFF2-40B4-BE49-F238E27FC236}">
-                <a16:creationId xmlns:a16="http://schemas.microsoft.com/office/drawing/2014/main" id="{46D08514-5BFB-D840-A304-E26DDA55384F}"/>
+                <a16:creationId xmlns:a16="http://schemas.microsoft.com/office/drawing/2014/main" id="{61452248-9E3B-7344-BC4D-8B3E968D92CB}"/>
               </a:ext>
             </a:extLst>
           </p:cNvPr>
@@ -3182,10 +3184,10 @@
       </p:sp>
       <p:sp>
         <p:nvSpPr>
-          <p:cNvPr id="216" name="Right Arrow 215">
+          <p:cNvPr id="165" name="Right Arrow 164">
             <a:extLst>
               <a:ext uri="{FF2B5EF4-FFF2-40B4-BE49-F238E27FC236}">
-                <a16:creationId xmlns:a16="http://schemas.microsoft.com/office/drawing/2014/main" id="{61D89D77-67AE-3E42-BEDE-2C7408D67E1F}"/>
+                <a16:creationId xmlns:a16="http://schemas.microsoft.com/office/drawing/2014/main" id="{AFC322F5-17A1-F943-B3D8-15C33F49FB62}"/>
               </a:ext>
             </a:extLst>
           </p:cNvPr>
@@ -3232,10 +3234,10 @@
       </p:sp>
       <p:sp>
         <p:nvSpPr>
-          <p:cNvPr id="217" name="Right Arrow 216">
+          <p:cNvPr id="166" name="Right Arrow 165">
             <a:extLst>
               <a:ext uri="{FF2B5EF4-FFF2-40B4-BE49-F238E27FC236}">
-                <a16:creationId xmlns:a16="http://schemas.microsoft.com/office/drawing/2014/main" id="{007B6247-165F-0147-9E8C-6EB97DEB97D7}"/>
+                <a16:creationId xmlns:a16="http://schemas.microsoft.com/office/drawing/2014/main" id="{ACAD11ED-5B54-244B-9C9A-6CAF0094F2E1}"/>
               </a:ext>
             </a:extLst>
           </p:cNvPr>
@@ -3282,10 +3284,10 @@
       </p:sp>
       <p:sp>
         <p:nvSpPr>
-          <p:cNvPr id="218" name="TextBox 217">
+          <p:cNvPr id="167" name="TextBox 166">
             <a:extLst>
               <a:ext uri="{FF2B5EF4-FFF2-40B4-BE49-F238E27FC236}">
-                <a16:creationId xmlns:a16="http://schemas.microsoft.com/office/drawing/2014/main" id="{DA698B5B-89A9-3E43-9FA3-7D55D4FE8FC1}"/>
+                <a16:creationId xmlns:a16="http://schemas.microsoft.com/office/drawing/2014/main" id="{6B358EC2-4C81-674B-94D6-59C26F9A82B2}"/>
               </a:ext>
             </a:extLst>
           </p:cNvPr>
@@ -3313,9 +3315,10 @@
           </a:bodyPr>
           <a:lstStyle/>
           <a:p>
+            <a:pPr algn="ctr"/>
             <a:r>
               <a:rPr lang="en-US" b="1" dirty="0"/>
-              <a:t>Associate regions with genes and compare</a:t>
+              <a:t>Intersect gene lists</a:t>
             </a:r>
             <a:endParaRPr lang="en-US" dirty="0"/>
           </a:p>
@@ -3323,10 +3326,10 @@
       </p:sp>
       <p:grpSp>
         <p:nvGrpSpPr>
-          <p:cNvPr id="219" name="Group 218">
+          <p:cNvPr id="168" name="Group 167">
             <a:extLst>
               <a:ext uri="{FF2B5EF4-FFF2-40B4-BE49-F238E27FC236}">
-                <a16:creationId xmlns:a16="http://schemas.microsoft.com/office/drawing/2014/main" id="{5AB85C39-BF81-504C-9C08-5055A416E4BC}"/>
+                <a16:creationId xmlns:a16="http://schemas.microsoft.com/office/drawing/2014/main" id="{887A9901-C9DC-C244-B7C2-A7611802A4E0}"/>
               </a:ext>
             </a:extLst>
           </p:cNvPr>
@@ -3343,10 +3346,10 @@
         </p:grpSpPr>
         <p:cxnSp>
           <p:nvCxnSpPr>
-            <p:cNvPr id="220" name="Straight Connector 219">
+            <p:cNvPr id="169" name="Straight Connector 168">
               <a:extLst>
                 <a:ext uri="{FF2B5EF4-FFF2-40B4-BE49-F238E27FC236}">
-                  <a16:creationId xmlns:a16="http://schemas.microsoft.com/office/drawing/2014/main" id="{6F635CFC-8AEF-9D42-967C-D49D8C780C8D}"/>
+                  <a16:creationId xmlns:a16="http://schemas.microsoft.com/office/drawing/2014/main" id="{9044B62F-6D70-0D4C-9EA0-0FC7C6E66237}"/>
                 </a:ext>
               </a:extLst>
             </p:cNvPr>
@@ -3386,10 +3389,10 @@
         </p:cxnSp>
         <p:sp>
           <p:nvSpPr>
-            <p:cNvPr id="221" name="Right Arrow 220">
+            <p:cNvPr id="170" name="Right Arrow 169">
               <a:extLst>
                 <a:ext uri="{FF2B5EF4-FFF2-40B4-BE49-F238E27FC236}">
-                  <a16:creationId xmlns:a16="http://schemas.microsoft.com/office/drawing/2014/main" id="{4FF74EE4-AEC9-1244-9B34-D7946CA5FBF2}"/>
+                  <a16:creationId xmlns:a16="http://schemas.microsoft.com/office/drawing/2014/main" id="{ADFF69AF-93B2-AA40-900E-8A6E955665D7}"/>
                 </a:ext>
               </a:extLst>
             </p:cNvPr>
@@ -3436,10 +3439,10 @@
         </p:sp>
         <p:sp>
           <p:nvSpPr>
-            <p:cNvPr id="222" name="Rectangle 221">
+            <p:cNvPr id="171" name="Rectangle 170">
               <a:extLst>
                 <a:ext uri="{FF2B5EF4-FFF2-40B4-BE49-F238E27FC236}">
-                  <a16:creationId xmlns:a16="http://schemas.microsoft.com/office/drawing/2014/main" id="{C16793F0-A634-4F4A-89DE-B59B8600231C}"/>
+                  <a16:creationId xmlns:a16="http://schemas.microsoft.com/office/drawing/2014/main" id="{88A1AA13-FF85-4648-8D98-A494CD8AFB83}"/>
                 </a:ext>
               </a:extLst>
             </p:cNvPr>
@@ -3487,10 +3490,10 @@
       </p:grpSp>
       <p:grpSp>
         <p:nvGrpSpPr>
-          <p:cNvPr id="223" name="Group 222">
+          <p:cNvPr id="172" name="Group 171">
             <a:extLst>
               <a:ext uri="{FF2B5EF4-FFF2-40B4-BE49-F238E27FC236}">
-                <a16:creationId xmlns:a16="http://schemas.microsoft.com/office/drawing/2014/main" id="{480F6EE7-5767-1B49-996B-3EC3EDEBA1F4}"/>
+                <a16:creationId xmlns:a16="http://schemas.microsoft.com/office/drawing/2014/main" id="{69CF1A03-19ED-7740-9BF0-2D642F184789}"/>
               </a:ext>
             </a:extLst>
           </p:cNvPr>
@@ -3507,10 +3510,10 @@
         </p:grpSpPr>
         <p:cxnSp>
           <p:nvCxnSpPr>
-            <p:cNvPr id="224" name="Straight Connector 223">
+            <p:cNvPr id="173" name="Straight Connector 172">
               <a:extLst>
                 <a:ext uri="{FF2B5EF4-FFF2-40B4-BE49-F238E27FC236}">
-                  <a16:creationId xmlns:a16="http://schemas.microsoft.com/office/drawing/2014/main" id="{394E4D69-28DC-9548-A614-AF49B370D367}"/>
+                  <a16:creationId xmlns:a16="http://schemas.microsoft.com/office/drawing/2014/main" id="{21AF3D59-6281-B743-B85E-628D29D97CDE}"/>
                 </a:ext>
               </a:extLst>
             </p:cNvPr>
@@ -3550,10 +3553,10 @@
         </p:cxnSp>
         <p:sp>
           <p:nvSpPr>
-            <p:cNvPr id="225" name="Right Arrow 224">
+            <p:cNvPr id="174" name="Right Arrow 173">
               <a:extLst>
                 <a:ext uri="{FF2B5EF4-FFF2-40B4-BE49-F238E27FC236}">
-                  <a16:creationId xmlns:a16="http://schemas.microsoft.com/office/drawing/2014/main" id="{9B715855-F19B-EA45-BD80-8F06C1E3A0F7}"/>
+                  <a16:creationId xmlns:a16="http://schemas.microsoft.com/office/drawing/2014/main" id="{BF6C265D-7157-CF45-9EBB-A580C6D883A7}"/>
                 </a:ext>
               </a:extLst>
             </p:cNvPr>
@@ -3600,10 +3603,10 @@
         </p:sp>
         <p:sp>
           <p:nvSpPr>
-            <p:cNvPr id="226" name="Rectangle 225">
+            <p:cNvPr id="175" name="Rectangle 174">
               <a:extLst>
                 <a:ext uri="{FF2B5EF4-FFF2-40B4-BE49-F238E27FC236}">
-                  <a16:creationId xmlns:a16="http://schemas.microsoft.com/office/drawing/2014/main" id="{53E6627D-464F-2B4B-8F7E-E3F27D7A238A}"/>
+                  <a16:creationId xmlns:a16="http://schemas.microsoft.com/office/drawing/2014/main" id="{9BFF0852-8365-2740-A830-3333CCBE2D32}"/>
                 </a:ext>
               </a:extLst>
             </p:cNvPr>
@@ -3651,10 +3654,10 @@
       </p:grpSp>
       <p:grpSp>
         <p:nvGrpSpPr>
-          <p:cNvPr id="227" name="Group 226">
+          <p:cNvPr id="176" name="Group 175">
             <a:extLst>
               <a:ext uri="{FF2B5EF4-FFF2-40B4-BE49-F238E27FC236}">
-                <a16:creationId xmlns:a16="http://schemas.microsoft.com/office/drawing/2014/main" id="{8089F6F2-0BCC-2F45-A6C1-EF330ED3E3FA}"/>
+                <a16:creationId xmlns:a16="http://schemas.microsoft.com/office/drawing/2014/main" id="{1EC341E8-E3A6-2C4A-9994-B6A66578DEB0}"/>
               </a:ext>
             </a:extLst>
           </p:cNvPr>
@@ -3671,10 +3674,10 @@
         </p:grpSpPr>
         <p:cxnSp>
           <p:nvCxnSpPr>
-            <p:cNvPr id="228" name="Straight Connector 227">
+            <p:cNvPr id="177" name="Straight Connector 176">
               <a:extLst>
                 <a:ext uri="{FF2B5EF4-FFF2-40B4-BE49-F238E27FC236}">
-                  <a16:creationId xmlns:a16="http://schemas.microsoft.com/office/drawing/2014/main" id="{056AB09A-81D7-F54A-A69E-6343EFDDAD9B}"/>
+                  <a16:creationId xmlns:a16="http://schemas.microsoft.com/office/drawing/2014/main" id="{430AFBFF-EF2C-264E-89AE-6ED5AB3578BA}"/>
                 </a:ext>
               </a:extLst>
             </p:cNvPr>
@@ -3714,10 +3717,10 @@
         </p:cxnSp>
         <p:sp>
           <p:nvSpPr>
-            <p:cNvPr id="229" name="Right Arrow 228">
+            <p:cNvPr id="178" name="Right Arrow 177">
               <a:extLst>
                 <a:ext uri="{FF2B5EF4-FFF2-40B4-BE49-F238E27FC236}">
-                  <a16:creationId xmlns:a16="http://schemas.microsoft.com/office/drawing/2014/main" id="{6E0CD8F6-0872-B644-AB1B-65200C99AD79}"/>
+                  <a16:creationId xmlns:a16="http://schemas.microsoft.com/office/drawing/2014/main" id="{06B0BF49-13E1-0749-9849-7F54ADB95226}"/>
                 </a:ext>
               </a:extLst>
             </p:cNvPr>
@@ -3764,10 +3767,10 @@
         </p:sp>
         <p:sp>
           <p:nvSpPr>
-            <p:cNvPr id="230" name="Rectangle 229">
+            <p:cNvPr id="179" name="Rectangle 178">
               <a:extLst>
                 <a:ext uri="{FF2B5EF4-FFF2-40B4-BE49-F238E27FC236}">
-                  <a16:creationId xmlns:a16="http://schemas.microsoft.com/office/drawing/2014/main" id="{CACF2817-1542-E846-A915-FCD3670DEF94}"/>
+                  <a16:creationId xmlns:a16="http://schemas.microsoft.com/office/drawing/2014/main" id="{257A2E3C-0003-2740-B1A9-7EBED2911152}"/>
                 </a:ext>
               </a:extLst>
             </p:cNvPr>
@@ -3815,10 +3818,10 @@
       </p:grpSp>
       <p:sp>
         <p:nvSpPr>
-          <p:cNvPr id="231" name="TextBox 230">
+          <p:cNvPr id="180" name="TextBox 179">
             <a:extLst>
               <a:ext uri="{FF2B5EF4-FFF2-40B4-BE49-F238E27FC236}">
-                <a16:creationId xmlns:a16="http://schemas.microsoft.com/office/drawing/2014/main" id="{ACC8A5B5-3BB0-354A-9AA0-8EE8E2B63A78}"/>
+                <a16:creationId xmlns:a16="http://schemas.microsoft.com/office/drawing/2014/main" id="{66208F37-25B2-8549-8A7D-0454B3B01199}"/>
               </a:ext>
             </a:extLst>
           </p:cNvPr>
@@ -3866,10 +3869,10 @@
       </p:sp>
       <p:sp>
         <p:nvSpPr>
-          <p:cNvPr id="232" name="TextBox 231">
+          <p:cNvPr id="181" name="TextBox 180">
             <a:extLst>
               <a:ext uri="{FF2B5EF4-FFF2-40B4-BE49-F238E27FC236}">
-                <a16:creationId xmlns:a16="http://schemas.microsoft.com/office/drawing/2014/main" id="{36C24F30-12F9-334E-BAF0-2C718EFA6D04}"/>
+                <a16:creationId xmlns:a16="http://schemas.microsoft.com/office/drawing/2014/main" id="{13D40DBD-137E-BF40-979C-3B06647BE21D}"/>
               </a:ext>
             </a:extLst>
           </p:cNvPr>
@@ -3894,7 +3897,15 @@
           <a:p>
             <a:r>
               <a:rPr lang="en-US" dirty="0"/>
-              <a:t>596 downregulated genes</a:t>
+              <a:t>596 </a:t>
+            </a:r>
+            <a:r>
+              <a:rPr lang="en-US" b="1" dirty="0"/>
+              <a:t>downregulated</a:t>
+            </a:r>
+            <a:r>
+              <a:rPr lang="en-US" dirty="0"/>
+              <a:t> genes</a:t>
             </a:r>
           </a:p>
           <a:p>
@@ -3903,17 +3914,25 @@
           <a:p>
             <a:r>
               <a:rPr lang="en-US" dirty="0"/>
-              <a:t>432 upregulated genes</a:t>
+              <a:t>432 </a:t>
+            </a:r>
+            <a:r>
+              <a:rPr lang="en-US" b="1" dirty="0"/>
+              <a:t>upregulated</a:t>
+            </a:r>
+            <a:r>
+              <a:rPr lang="en-US" dirty="0"/>
+              <a:t> genes</a:t>
             </a:r>
           </a:p>
         </p:txBody>
       </p:sp>
       <p:cxnSp>
         <p:nvCxnSpPr>
-          <p:cNvPr id="233" name="Straight Arrow Connector 232">
+          <p:cNvPr id="182" name="Straight Arrow Connector 181">
             <a:extLst>
               <a:ext uri="{FF2B5EF4-FFF2-40B4-BE49-F238E27FC236}">
-                <a16:creationId xmlns:a16="http://schemas.microsoft.com/office/drawing/2014/main" id="{0D88BB11-BB59-A843-BAC4-316EA5957A86}"/>
+                <a16:creationId xmlns:a16="http://schemas.microsoft.com/office/drawing/2014/main" id="{6957BBFB-9A80-6047-B863-25D7708A5D7E}"/>
               </a:ext>
             </a:extLst>
           </p:cNvPr>
@@ -3949,10 +3968,10 @@
       </p:cxnSp>
       <p:sp>
         <p:nvSpPr>
-          <p:cNvPr id="234" name="TextBox 233">
+          <p:cNvPr id="183" name="TextBox 182">
             <a:extLst>
               <a:ext uri="{FF2B5EF4-FFF2-40B4-BE49-F238E27FC236}">
-                <a16:creationId xmlns:a16="http://schemas.microsoft.com/office/drawing/2014/main" id="{342DB662-F39B-E44F-8AA6-7451522AB000}"/>
+                <a16:creationId xmlns:a16="http://schemas.microsoft.com/office/drawing/2014/main" id="{8644B6AF-1877-8945-AE17-1AB8E19F1676}"/>
               </a:ext>
             </a:extLst>
           </p:cNvPr>
@@ -4000,10 +4019,10 @@
       </p:sp>
       <p:sp>
         <p:nvSpPr>
-          <p:cNvPr id="235" name="TextBox 234">
+          <p:cNvPr id="184" name="TextBox 183">
             <a:extLst>
               <a:ext uri="{FF2B5EF4-FFF2-40B4-BE49-F238E27FC236}">
-                <a16:creationId xmlns:a16="http://schemas.microsoft.com/office/drawing/2014/main" id="{1AC2636E-F32F-E142-9242-CE7E8A86AF33}"/>
+                <a16:creationId xmlns:a16="http://schemas.microsoft.com/office/drawing/2014/main" id="{96A650E0-8346-3C44-AF63-C1E2B6B4FB57}"/>
               </a:ext>
             </a:extLst>
           </p:cNvPr>
@@ -4012,8 +4031,8 @@
         </p:nvSpPr>
         <p:spPr>
           <a:xfrm>
-            <a:off x="4929112" y="1497254"/>
-            <a:ext cx="4219910" cy="923330"/>
+            <a:off x="4450110" y="1497254"/>
+            <a:ext cx="5770886" cy="923330"/>
           </a:xfrm>
           <a:prstGeom prst="rect">
             <a:avLst/>
@@ -4029,7 +4048,15 @@
             <a:pPr algn="r"/>
             <a:r>
               <a:rPr lang="en-US" dirty="0"/>
-              <a:t>884 regions had positive correlation</a:t>
+              <a:t>884 genes had associated regions with </a:t>
+            </a:r>
+            <a:r>
+              <a:rPr lang="en-US" b="1" dirty="0"/>
+              <a:t>positive</a:t>
+            </a:r>
+            <a:r>
+              <a:rPr lang="en-US" dirty="0"/>
+              <a:t> correlation</a:t>
             </a:r>
           </a:p>
           <a:p>
@@ -4040,17 +4067,25 @@
             <a:pPr algn="r"/>
             <a:r>
               <a:rPr lang="en-US" dirty="0"/>
-              <a:t>502 regions had negative correlation</a:t>
+              <a:t>502 genes had associated regions with </a:t>
+            </a:r>
+            <a:r>
+              <a:rPr lang="en-US" b="1" dirty="0"/>
+              <a:t>negative</a:t>
+            </a:r>
+            <a:r>
+              <a:rPr lang="en-US" dirty="0"/>
+              <a:t> correlation</a:t>
             </a:r>
           </a:p>
         </p:txBody>
       </p:sp>
       <p:cxnSp>
         <p:nvCxnSpPr>
-          <p:cNvPr id="236" name="Straight Arrow Connector 235">
+          <p:cNvPr id="185" name="Straight Arrow Connector 184">
             <a:extLst>
               <a:ext uri="{FF2B5EF4-FFF2-40B4-BE49-F238E27FC236}">
-                <a16:creationId xmlns:a16="http://schemas.microsoft.com/office/drawing/2014/main" id="{35941926-754A-3840-82AF-80AF8FD5EE34}"/>
+                <a16:creationId xmlns:a16="http://schemas.microsoft.com/office/drawing/2014/main" id="{497724AA-FC0D-F24E-8696-89F164558FFA}"/>
               </a:ext>
             </a:extLst>
           </p:cNvPr>
@@ -4086,10 +4121,10 @@
       </p:cxnSp>
       <p:sp>
         <p:nvSpPr>
-          <p:cNvPr id="237" name="Rectangle 236">
+          <p:cNvPr id="187" name="Rectangle 186">
             <a:extLst>
               <a:ext uri="{FF2B5EF4-FFF2-40B4-BE49-F238E27FC236}">
-                <a16:creationId xmlns:a16="http://schemas.microsoft.com/office/drawing/2014/main" id="{F8EFC81D-430C-C243-8A8F-C1F2319A20FC}"/>
+                <a16:creationId xmlns:a16="http://schemas.microsoft.com/office/drawing/2014/main" id="{AD5398D8-A559-6D40-8A4F-7A978D89A6B4}"/>
               </a:ext>
             </a:extLst>
           </p:cNvPr>
@@ -4098,16 +4133,16 @@
         </p:nvSpPr>
         <p:spPr>
           <a:xfrm>
-            <a:off x="9289268" y="1554655"/>
+            <a:off x="10361240" y="2118535"/>
             <a:ext cx="158016" cy="245087"/>
           </a:xfrm>
           <a:prstGeom prst="rect">
             <a:avLst/>
           </a:prstGeom>
           <a:solidFill>
-            <a:schemeClr val="accent6">
-              <a:lumMod val="40000"/>
-              <a:lumOff val="60000"/>
+            <a:schemeClr val="accent2">
+              <a:lumMod val="60000"/>
+              <a:lumOff val="40000"/>
             </a:schemeClr>
           </a:solidFill>
         </p:spPr>
@@ -4134,62 +4169,12 @@
           </a:p>
         </p:txBody>
       </p:sp>
-      <p:sp>
-        <p:nvSpPr>
-          <p:cNvPr id="238" name="Rectangle 237">
+      <p:cxnSp>
+        <p:nvCxnSpPr>
+          <p:cNvPr id="188" name="Straight Arrow Connector 187">
             <a:extLst>
               <a:ext uri="{FF2B5EF4-FFF2-40B4-BE49-F238E27FC236}">
-                <a16:creationId xmlns:a16="http://schemas.microsoft.com/office/drawing/2014/main" id="{509E7A12-C555-1B4F-9C18-24140C04EA13}"/>
-              </a:ext>
-            </a:extLst>
-          </p:cNvPr>
-          <p:cNvSpPr/>
-          <p:nvPr/>
-        </p:nvSpPr>
-        <p:spPr>
-          <a:xfrm>
-            <a:off x="9289268" y="2118535"/>
-            <a:ext cx="158016" cy="245087"/>
-          </a:xfrm>
-          <a:prstGeom prst="rect">
-            <a:avLst/>
-          </a:prstGeom>
-          <a:solidFill>
-            <a:schemeClr val="accent2">
-              <a:lumMod val="60000"/>
-              <a:lumOff val="40000"/>
-            </a:schemeClr>
-          </a:solidFill>
-        </p:spPr>
-        <p:style>
-          <a:lnRef idx="2">
-            <a:schemeClr val="dk1"/>
-          </a:lnRef>
-          <a:fillRef idx="1">
-            <a:schemeClr val="lt1"/>
-          </a:fillRef>
-          <a:effectRef idx="0">
-            <a:schemeClr val="dk1"/>
-          </a:effectRef>
-          <a:fontRef idx="minor">
-            <a:schemeClr val="dk1"/>
-          </a:fontRef>
-        </p:style>
-        <p:txBody>
-          <a:bodyPr rtlCol="0" anchor="ctr"/>
-          <a:lstStyle/>
-          <a:p>
-            <a:pPr algn="ctr"/>
-            <a:endParaRPr lang="en-US"/>
-          </a:p>
-        </p:txBody>
-      </p:sp>
-      <p:cxnSp>
-        <p:nvCxnSpPr>
-          <p:cNvPr id="239" name="Straight Arrow Connector 238">
-            <a:extLst>
-              <a:ext uri="{FF2B5EF4-FFF2-40B4-BE49-F238E27FC236}">
-                <a16:creationId xmlns:a16="http://schemas.microsoft.com/office/drawing/2014/main" id="{C07B8599-DBB1-5D49-89B5-9CC233432496}"/>
+                <a16:creationId xmlns:a16="http://schemas.microsoft.com/office/drawing/2014/main" id="{D6AA495B-6A34-2744-AB18-E41E94B21181}"/>
               </a:ext>
             </a:extLst>
           </p:cNvPr>
@@ -4227,10 +4212,10 @@
       </p:cxnSp>
       <p:cxnSp>
         <p:nvCxnSpPr>
-          <p:cNvPr id="240" name="Straight Arrow Connector 239">
+          <p:cNvPr id="189" name="Straight Arrow Connector 188">
             <a:extLst>
               <a:ext uri="{FF2B5EF4-FFF2-40B4-BE49-F238E27FC236}">
-                <a16:creationId xmlns:a16="http://schemas.microsoft.com/office/drawing/2014/main" id="{B401C993-928F-C249-9B7A-31DE24E9FD87}"/>
+                <a16:creationId xmlns:a16="http://schemas.microsoft.com/office/drawing/2014/main" id="{82780181-F069-1D47-BCCF-8AA159D6E6CC}"/>
               </a:ext>
             </a:extLst>
           </p:cNvPr>
@@ -4268,16 +4253,16 @@
       </p:cxnSp>
       <p:cxnSp>
         <p:nvCxnSpPr>
-          <p:cNvPr id="241" name="Straight Arrow Connector 240">
+          <p:cNvPr id="190" name="Straight Arrow Connector 189">
             <a:extLst>
               <a:ext uri="{FF2B5EF4-FFF2-40B4-BE49-F238E27FC236}">
-                <a16:creationId xmlns:a16="http://schemas.microsoft.com/office/drawing/2014/main" id="{21288990-97B7-6745-91B5-511197DAE1EC}"/>
+                <a16:creationId xmlns:a16="http://schemas.microsoft.com/office/drawing/2014/main" id="{D498FC19-22E0-2E4B-B8D7-39179387BBF9}"/>
               </a:ext>
             </a:extLst>
           </p:cNvPr>
           <p:cNvCxnSpPr>
             <a:cxnSpLocks/>
-            <a:stCxn id="218" idx="2"/>
+            <a:stCxn id="167" idx="2"/>
           </p:cNvCxnSpPr>
           <p:nvPr/>
         </p:nvCxnSpPr>
@@ -4310,16 +4295,16 @@
       </p:cxnSp>
       <p:cxnSp>
         <p:nvCxnSpPr>
-          <p:cNvPr id="242" name="Straight Arrow Connector 241">
+          <p:cNvPr id="191" name="Straight Arrow Connector 190">
             <a:extLst>
               <a:ext uri="{FF2B5EF4-FFF2-40B4-BE49-F238E27FC236}">
-                <a16:creationId xmlns:a16="http://schemas.microsoft.com/office/drawing/2014/main" id="{48F3BE3D-0A03-D844-93F0-367018A8E4C1}"/>
+                <a16:creationId xmlns:a16="http://schemas.microsoft.com/office/drawing/2014/main" id="{52E83AEE-D9FA-C941-935B-39477A10E75D}"/>
               </a:ext>
             </a:extLst>
           </p:cNvPr>
           <p:cNvCxnSpPr>
             <a:cxnSpLocks/>
-            <a:stCxn id="218" idx="2"/>
+            <a:stCxn id="167" idx="2"/>
           </p:cNvCxnSpPr>
           <p:nvPr/>
         </p:nvCxnSpPr>
@@ -4352,16 +4337,16 @@
       </p:cxnSp>
       <p:cxnSp>
         <p:nvCxnSpPr>
-          <p:cNvPr id="243" name="Straight Arrow Connector 242">
+          <p:cNvPr id="192" name="Straight Arrow Connector 191">
             <a:extLst>
               <a:ext uri="{FF2B5EF4-FFF2-40B4-BE49-F238E27FC236}">
-                <a16:creationId xmlns:a16="http://schemas.microsoft.com/office/drawing/2014/main" id="{B5EA913D-8178-8348-94EC-34CAEFA893DB}"/>
+                <a16:creationId xmlns:a16="http://schemas.microsoft.com/office/drawing/2014/main" id="{7AC62F01-BB6A-8A4C-97CB-46EEBA3BE21E}"/>
               </a:ext>
             </a:extLst>
           </p:cNvPr>
           <p:cNvCxnSpPr>
             <a:cxnSpLocks/>
-            <a:stCxn id="218" idx="2"/>
+            <a:stCxn id="167" idx="2"/>
           </p:cNvCxnSpPr>
           <p:nvPr/>
         </p:nvCxnSpPr>
@@ -4394,16 +4379,16 @@
       </p:cxnSp>
       <p:cxnSp>
         <p:nvCxnSpPr>
-          <p:cNvPr id="244" name="Straight Arrow Connector 243">
+          <p:cNvPr id="193" name="Straight Arrow Connector 192">
             <a:extLst>
               <a:ext uri="{FF2B5EF4-FFF2-40B4-BE49-F238E27FC236}">
-                <a16:creationId xmlns:a16="http://schemas.microsoft.com/office/drawing/2014/main" id="{45F6240A-E9F6-FE4E-9FDF-733FA53EF3D9}"/>
+                <a16:creationId xmlns:a16="http://schemas.microsoft.com/office/drawing/2014/main" id="{9928A0F3-C63F-884C-8722-DD8154313243}"/>
               </a:ext>
             </a:extLst>
           </p:cNvPr>
           <p:cNvCxnSpPr>
             <a:cxnSpLocks/>
-            <a:stCxn id="218" idx="2"/>
+            <a:stCxn id="167" idx="2"/>
           </p:cNvCxnSpPr>
           <p:nvPr/>
         </p:nvCxnSpPr>
@@ -4436,10 +4421,10 @@
       </p:cxnSp>
       <p:sp>
         <p:nvSpPr>
-          <p:cNvPr id="245" name="TextBox 244">
+          <p:cNvPr id="194" name="TextBox 193">
             <a:extLst>
               <a:ext uri="{FF2B5EF4-FFF2-40B4-BE49-F238E27FC236}">
-                <a16:creationId xmlns:a16="http://schemas.microsoft.com/office/drawing/2014/main" id="{407E9F35-D4B3-8942-9570-11895B0DF867}"/>
+                <a16:creationId xmlns:a16="http://schemas.microsoft.com/office/drawing/2014/main" id="{E786094D-573B-7E42-8287-49D420B105AC}"/>
               </a:ext>
             </a:extLst>
           </p:cNvPr>
@@ -4487,10 +4472,10 @@
       </p:sp>
       <p:sp>
         <p:nvSpPr>
-          <p:cNvPr id="246" name="TextBox 245">
+          <p:cNvPr id="195" name="TextBox 194">
             <a:extLst>
               <a:ext uri="{FF2B5EF4-FFF2-40B4-BE49-F238E27FC236}">
-                <a16:creationId xmlns:a16="http://schemas.microsoft.com/office/drawing/2014/main" id="{4688D300-70AA-CB4B-A512-1142D4635AB9}"/>
+                <a16:creationId xmlns:a16="http://schemas.microsoft.com/office/drawing/2014/main" id="{94E03417-BF01-744C-8FD8-A04D34E74CDF}"/>
               </a:ext>
             </a:extLst>
           </p:cNvPr>
@@ -4538,10 +4523,10 @@
       </p:sp>
       <p:sp>
         <p:nvSpPr>
-          <p:cNvPr id="247" name="TextBox 246">
+          <p:cNvPr id="196" name="TextBox 195">
             <a:extLst>
               <a:ext uri="{FF2B5EF4-FFF2-40B4-BE49-F238E27FC236}">
-                <a16:creationId xmlns:a16="http://schemas.microsoft.com/office/drawing/2014/main" id="{ED61ADD5-B16C-AE4F-9318-E26D42A31310}"/>
+                <a16:creationId xmlns:a16="http://schemas.microsoft.com/office/drawing/2014/main" id="{11E34F76-8E9D-E041-8B2D-49D705681C6A}"/>
               </a:ext>
             </a:extLst>
           </p:cNvPr>
@@ -4589,10 +4574,10 @@
       </p:sp>
       <p:cxnSp>
         <p:nvCxnSpPr>
-          <p:cNvPr id="248" name="Straight Arrow Connector 247">
+          <p:cNvPr id="197" name="Straight Arrow Connector 196">
             <a:extLst>
               <a:ext uri="{FF2B5EF4-FFF2-40B4-BE49-F238E27FC236}">
-                <a16:creationId xmlns:a16="http://schemas.microsoft.com/office/drawing/2014/main" id="{46EAFCAB-5294-F040-BBDB-8F42123A7774}"/>
+                <a16:creationId xmlns:a16="http://schemas.microsoft.com/office/drawing/2014/main" id="{4ECF677E-C6BA-FB49-BEFB-6BF0773BCD3A}"/>
               </a:ext>
             </a:extLst>
           </p:cNvPr>
@@ -4628,10 +4613,10 @@
       </p:cxnSp>
       <p:cxnSp>
         <p:nvCxnSpPr>
-          <p:cNvPr id="249" name="Straight Arrow Connector 248">
+          <p:cNvPr id="198" name="Straight Arrow Connector 197">
             <a:extLst>
               <a:ext uri="{FF2B5EF4-FFF2-40B4-BE49-F238E27FC236}">
-                <a16:creationId xmlns:a16="http://schemas.microsoft.com/office/drawing/2014/main" id="{EF37E5F0-8DBF-8548-AEF7-EA06154BF7B9}"/>
+                <a16:creationId xmlns:a16="http://schemas.microsoft.com/office/drawing/2014/main" id="{B2035A51-665B-3649-87F3-AB7F03FF387F}"/>
               </a:ext>
             </a:extLst>
           </p:cNvPr>
@@ -4667,10 +4652,10 @@
       </p:cxnSp>
       <p:cxnSp>
         <p:nvCxnSpPr>
-          <p:cNvPr id="250" name="Straight Arrow Connector 249">
+          <p:cNvPr id="199" name="Straight Arrow Connector 198">
             <a:extLst>
               <a:ext uri="{FF2B5EF4-FFF2-40B4-BE49-F238E27FC236}">
-                <a16:creationId xmlns:a16="http://schemas.microsoft.com/office/drawing/2014/main" id="{F8DE8A99-D083-0144-B762-FAAEC0548F1C}"/>
+                <a16:creationId xmlns:a16="http://schemas.microsoft.com/office/drawing/2014/main" id="{48E226DB-BE4C-204C-8B8C-174EEA893E4B}"/>
               </a:ext>
             </a:extLst>
           </p:cNvPr>
@@ -4706,10 +4691,10 @@
       </p:cxnSp>
       <p:cxnSp>
         <p:nvCxnSpPr>
-          <p:cNvPr id="251" name="Straight Arrow Connector 250">
+          <p:cNvPr id="200" name="Straight Arrow Connector 199">
             <a:extLst>
               <a:ext uri="{FF2B5EF4-FFF2-40B4-BE49-F238E27FC236}">
-                <a16:creationId xmlns:a16="http://schemas.microsoft.com/office/drawing/2014/main" id="{76DAEA29-C2CF-7246-A1E2-BD1B6FA55981}"/>
+                <a16:creationId xmlns:a16="http://schemas.microsoft.com/office/drawing/2014/main" id="{AABB9E82-DECA-424E-8078-645290E3D916}"/>
               </a:ext>
             </a:extLst>
           </p:cNvPr>
@@ -4745,10 +4730,10 @@
       </p:cxnSp>
       <p:sp>
         <p:nvSpPr>
-          <p:cNvPr id="252" name="TextBox 251">
+          <p:cNvPr id="201" name="TextBox 200">
             <a:extLst>
               <a:ext uri="{FF2B5EF4-FFF2-40B4-BE49-F238E27FC236}">
-                <a16:creationId xmlns:a16="http://schemas.microsoft.com/office/drawing/2014/main" id="{70B7E46C-E33F-B448-A78C-93439B9E0B66}"/>
+                <a16:creationId xmlns:a16="http://schemas.microsoft.com/office/drawing/2014/main" id="{E046B8BB-35F5-524C-BD72-8F5AEA6AC14B}"/>
               </a:ext>
             </a:extLst>
           </p:cNvPr>
@@ -4757,7 +4742,7 @@
         </p:nvSpPr>
         <p:spPr>
           <a:xfrm>
-            <a:off x="-131599" y="5970675"/>
+            <a:off x="-131599" y="9521720"/>
             <a:ext cx="2459407" cy="369332"/>
           </a:xfrm>
           <a:prstGeom prst="rect">
@@ -4774,7 +4759,7 @@
             <a:pPr algn="ctr"/>
             <a:r>
               <a:rPr lang="en-US" b="1" dirty="0"/>
-              <a:t>p-value = 6.4*10</a:t>
+              <a:t>adj p-value = 6.4*10</a:t>
             </a:r>
             <a:r>
               <a:rPr lang="en-US" b="1" baseline="30000" dirty="0"/>
@@ -4785,10 +4770,10 @@
       </p:sp>
       <p:sp>
         <p:nvSpPr>
-          <p:cNvPr id="253" name="TextBox 252">
+          <p:cNvPr id="202" name="TextBox 201">
             <a:extLst>
               <a:ext uri="{FF2B5EF4-FFF2-40B4-BE49-F238E27FC236}">
-                <a16:creationId xmlns:a16="http://schemas.microsoft.com/office/drawing/2014/main" id="{B4423EAD-79C2-C241-AC1A-D7C3D133A735}"/>
+                <a16:creationId xmlns:a16="http://schemas.microsoft.com/office/drawing/2014/main" id="{974B4FC1-99A4-CA4A-9631-C8B006933160}"/>
               </a:ext>
             </a:extLst>
           </p:cNvPr>
@@ -4797,7 +4782,7 @@
         </p:nvSpPr>
         <p:spPr>
           <a:xfrm>
-            <a:off x="4931934" y="5966662"/>
+            <a:off x="4931934" y="9517707"/>
             <a:ext cx="2783359" cy="369332"/>
           </a:xfrm>
           <a:prstGeom prst="rect">
@@ -4814,7 +4799,7 @@
             <a:pPr algn="ctr"/>
             <a:r>
               <a:rPr lang="en-US" dirty="0"/>
-              <a:t>p-value = 0.3</a:t>
+              <a:t>adj p-value = 0.3</a:t>
             </a:r>
             <a:endParaRPr lang="en-US" baseline="30000" dirty="0"/>
           </a:p>
@@ -4822,10 +4807,10 @@
       </p:sp>
       <p:sp>
         <p:nvSpPr>
-          <p:cNvPr id="254" name="TextBox 253">
+          <p:cNvPr id="203" name="TextBox 202">
             <a:extLst>
               <a:ext uri="{FF2B5EF4-FFF2-40B4-BE49-F238E27FC236}">
-                <a16:creationId xmlns:a16="http://schemas.microsoft.com/office/drawing/2014/main" id="{7B3BA623-136B-C64F-BE28-707C33D737AC}"/>
+                <a16:creationId xmlns:a16="http://schemas.microsoft.com/office/drawing/2014/main" id="{15D607BE-53B7-A14C-BE2E-96B7A2E14D96}"/>
               </a:ext>
             </a:extLst>
           </p:cNvPr>
@@ -4834,7 +4819,7 @@
         </p:nvSpPr>
         <p:spPr>
           <a:xfrm>
-            <a:off x="2212617" y="5970675"/>
+            <a:off x="2212617" y="9521720"/>
             <a:ext cx="2783359" cy="369332"/>
           </a:xfrm>
           <a:prstGeom prst="rect">
@@ -4851,7 +4836,7 @@
             <a:pPr algn="ctr"/>
             <a:r>
               <a:rPr lang="en-US" dirty="0"/>
-              <a:t>p-value = 0.82</a:t>
+              <a:t>adj p-value = 0.82</a:t>
             </a:r>
             <a:endParaRPr lang="en-US" baseline="30000" dirty="0"/>
           </a:p>
@@ -4859,10 +4844,10 @@
       </p:sp>
       <p:sp>
         <p:nvSpPr>
-          <p:cNvPr id="255" name="TextBox 254">
+          <p:cNvPr id="204" name="TextBox 203">
             <a:extLst>
               <a:ext uri="{FF2B5EF4-FFF2-40B4-BE49-F238E27FC236}">
-                <a16:creationId xmlns:a16="http://schemas.microsoft.com/office/drawing/2014/main" id="{583DE590-6808-824C-AF01-056E27E503F4}"/>
+                <a16:creationId xmlns:a16="http://schemas.microsoft.com/office/drawing/2014/main" id="{FA22D94F-D19E-414B-8FFB-75AE470D727A}"/>
               </a:ext>
             </a:extLst>
           </p:cNvPr>
@@ -4871,7 +4856,7 @@
         </p:nvSpPr>
         <p:spPr>
           <a:xfrm>
-            <a:off x="7717820" y="5970675"/>
+            <a:off x="7717820" y="9521720"/>
             <a:ext cx="2331100" cy="369332"/>
           </a:xfrm>
           <a:prstGeom prst="rect">
@@ -4888,12 +4873,1322 @@
             <a:pPr algn="ctr"/>
             <a:r>
               <a:rPr lang="en-US" dirty="0"/>
-              <a:t>p-value = 0.071</a:t>
+              <a:t>adj p-value = 0.071</a:t>
             </a:r>
             <a:endParaRPr lang="en-US" baseline="30000" dirty="0"/>
           </a:p>
         </p:txBody>
       </p:sp>
+      <p:graphicFrame>
+        <p:nvGraphicFramePr>
+          <p:cNvPr id="205" name="Table 2">
+            <a:extLst>
+              <a:ext uri="{FF2B5EF4-FFF2-40B4-BE49-F238E27FC236}">
+                <a16:creationId xmlns:a16="http://schemas.microsoft.com/office/drawing/2014/main" id="{0582C6AC-5BF8-8F4F-ACF9-883BCFE6F627}"/>
+              </a:ext>
+            </a:extLst>
+          </p:cNvPr>
+          <p:cNvGraphicFramePr>
+            <a:graphicFrameLocks noGrp="1"/>
+          </p:cNvGraphicFramePr>
+          <p:nvPr>
+            <p:extLst>
+              <p:ext uri="{D42A27DB-BD31-4B8C-83A1-F6EECF244321}">
+                <p14:modId xmlns:p14="http://schemas.microsoft.com/office/powerpoint/2010/main" val="555676761"/>
+              </p:ext>
+            </p:extLst>
+          </p:nvPr>
+        </p:nvGraphicFramePr>
+        <p:xfrm>
+          <a:off x="17848214" y="1897880"/>
+          <a:ext cx="2965628" cy="987552"/>
+        </p:xfrm>
+        <a:graphic>
+          <a:graphicData uri="http://schemas.openxmlformats.org/drawingml/2006/table">
+            <a:tbl>
+              <a:tblPr firstRow="1" bandRow="1">
+                <a:tableStyleId>{5940675A-B579-460E-94D1-54222C63F5DA}</a:tableStyleId>
+              </a:tblPr>
+              <a:tblGrid>
+                <a:gridCol w="1482814">
+                  <a:extLst>
+                    <a:ext uri="{9D8B030D-6E8A-4147-A177-3AD203B41FA5}">
+                      <a16:colId xmlns:a16="http://schemas.microsoft.com/office/drawing/2014/main" val="1817326449"/>
+                    </a:ext>
+                  </a:extLst>
+                </a:gridCol>
+                <a:gridCol w="1482814">
+                  <a:extLst>
+                    <a:ext uri="{9D8B030D-6E8A-4147-A177-3AD203B41FA5}">
+                      <a16:colId xmlns:a16="http://schemas.microsoft.com/office/drawing/2014/main" val="1367557698"/>
+                    </a:ext>
+                  </a:extLst>
+                </a:gridCol>
+              </a:tblGrid>
+              <a:tr h="370840">
+                <a:tc>
+                  <a:txBody>
+                    <a:bodyPr/>
+                    <a:lstStyle/>
+                    <a:p>
+                      <a:r>
+                        <a:rPr lang="en-US" dirty="0"/>
+                        <a:t>43</a:t>
+                      </a:r>
+                    </a:p>
+                  </a:txBody>
+                  <a:tcPr/>
+                </a:tc>
+                <a:tc>
+                  <a:txBody>
+                    <a:bodyPr/>
+                    <a:lstStyle/>
+                    <a:p>
+                      <a:r>
+                        <a:rPr lang="en-US" dirty="0"/>
+                        <a:t>553</a:t>
+                      </a:r>
+                    </a:p>
+                  </a:txBody>
+                  <a:tcPr/>
+                </a:tc>
+                <a:extLst>
+                  <a:ext uri="{0D108BD9-81ED-4DB2-BD59-A6C34878D82A}">
+                    <a16:rowId xmlns:a16="http://schemas.microsoft.com/office/drawing/2014/main" val="3537880068"/>
+                  </a:ext>
+                </a:extLst>
+              </a:tr>
+              <a:tr h="370840">
+                <a:tc>
+                  <a:txBody>
+                    <a:bodyPr/>
+                    <a:lstStyle/>
+                    <a:p>
+                      <a:r>
+                        <a:rPr lang="en-US" dirty="0"/>
+                        <a:t>841</a:t>
+                      </a:r>
+                    </a:p>
+                  </a:txBody>
+                  <a:tcPr/>
+                </a:tc>
+                <a:tc>
+                  <a:txBody>
+                    <a:bodyPr/>
+                    <a:lstStyle/>
+                    <a:p>
+                      <a:r>
+                        <a:rPr lang="en-US" sz="1980" b="0" i="0" kern="1200" dirty="0">
+                          <a:solidFill>
+                            <a:schemeClr val="tx1"/>
+                          </a:solidFill>
+                          <a:effectLst/>
+                          <a:latin typeface="+mn-lt"/>
+                          <a:ea typeface="+mn-ea"/>
+                          <a:cs typeface="+mn-cs"/>
+                        </a:rPr>
+                        <a:t>23264</a:t>
+                      </a:r>
+                      <a:endParaRPr lang="en-US" dirty="0"/>
+                    </a:p>
+                  </a:txBody>
+                  <a:tcPr/>
+                </a:tc>
+                <a:extLst>
+                  <a:ext uri="{0D108BD9-81ED-4DB2-BD59-A6C34878D82A}">
+                    <a16:rowId xmlns:a16="http://schemas.microsoft.com/office/drawing/2014/main" val="3286202952"/>
+                  </a:ext>
+                </a:extLst>
+              </a:tr>
+            </a:tbl>
+          </a:graphicData>
+        </a:graphic>
+      </p:graphicFrame>
+      <p:sp>
+        <p:nvSpPr>
+          <p:cNvPr id="206" name="TextBox 205">
+            <a:extLst>
+              <a:ext uri="{FF2B5EF4-FFF2-40B4-BE49-F238E27FC236}">
+                <a16:creationId xmlns:a16="http://schemas.microsoft.com/office/drawing/2014/main" id="{F812734C-C25E-004E-974D-CAF61A4DD584}"/>
+              </a:ext>
+            </a:extLst>
+          </p:cNvPr>
+          <p:cNvSpPr txBox="1"/>
+          <p:nvPr/>
+        </p:nvSpPr>
+        <p:spPr>
+          <a:xfrm>
+            <a:off x="16528810" y="641675"/>
+            <a:ext cx="5795095" cy="646331"/>
+          </a:xfrm>
+          <a:prstGeom prst="rect">
+            <a:avLst/>
+          </a:prstGeom>
+          <a:noFill/>
+        </p:spPr>
+        <p:txBody>
+          <a:bodyPr wrap="square" rtlCol="0">
+            <a:spAutoFit/>
+          </a:bodyPr>
+          <a:lstStyle/>
+          <a:p>
+            <a:pPr algn="ctr"/>
+            <a:r>
+              <a:rPr lang="en-US" b="1" dirty="0"/>
+              <a:t>Gene has associated </a:t>
+            </a:r>
+            <a:r>
+              <a:rPr lang="en-US" b="1" dirty="0" err="1"/>
+              <a:t>Himorna</a:t>
+            </a:r>
+            <a:r>
+              <a:rPr lang="en-US" b="1" dirty="0"/>
+              <a:t> peak with </a:t>
+            </a:r>
+            <a:r>
+              <a:rPr lang="en-US" b="1" dirty="0" err="1"/>
+              <a:t>postive</a:t>
+            </a:r>
+            <a:r>
+              <a:rPr lang="en-US" b="1" dirty="0"/>
+              <a:t> correlation between </a:t>
+            </a:r>
+            <a:r>
+              <a:rPr lang="en-US" dirty="0"/>
+              <a:t>lncRNA RP11-398K22.12  and H3K27ac</a:t>
+            </a:r>
+          </a:p>
+        </p:txBody>
+      </p:sp>
+      <p:sp>
+        <p:nvSpPr>
+          <p:cNvPr id="207" name="TextBox 206">
+            <a:extLst>
+              <a:ext uri="{FF2B5EF4-FFF2-40B4-BE49-F238E27FC236}">
+                <a16:creationId xmlns:a16="http://schemas.microsoft.com/office/drawing/2014/main" id="{408B074E-A6A2-2644-B152-3BC84FBF6BFE}"/>
+              </a:ext>
+            </a:extLst>
+          </p:cNvPr>
+          <p:cNvSpPr txBox="1"/>
+          <p:nvPr/>
+        </p:nvSpPr>
+        <p:spPr>
+          <a:xfrm>
+            <a:off x="13631692" y="1812937"/>
+            <a:ext cx="2686022" cy="923330"/>
+          </a:xfrm>
+          <a:prstGeom prst="rect">
+            <a:avLst/>
+          </a:prstGeom>
+          <a:noFill/>
+        </p:spPr>
+        <p:txBody>
+          <a:bodyPr wrap="square" rtlCol="0">
+            <a:spAutoFit/>
+          </a:bodyPr>
+          <a:lstStyle/>
+          <a:p>
+            <a:pPr algn="ctr"/>
+            <a:r>
+              <a:rPr lang="en-US" dirty="0"/>
+              <a:t>Gene </a:t>
+            </a:r>
+            <a:r>
+              <a:rPr lang="en-US" b="1" dirty="0"/>
+              <a:t>downregulated</a:t>
+            </a:r>
+            <a:r>
+              <a:rPr lang="en-US" dirty="0"/>
+              <a:t> after lncRNA RP11-398K22.12 knockdown</a:t>
+            </a:r>
+          </a:p>
+        </p:txBody>
+      </p:sp>
+      <p:sp>
+        <p:nvSpPr>
+          <p:cNvPr id="208" name="TextBox 207">
+            <a:extLst>
+              <a:ext uri="{FF2B5EF4-FFF2-40B4-BE49-F238E27FC236}">
+                <a16:creationId xmlns:a16="http://schemas.microsoft.com/office/drawing/2014/main" id="{92A85038-AA3B-5142-9A2C-2F2AE3D20A3F}"/>
+              </a:ext>
+            </a:extLst>
+          </p:cNvPr>
+          <p:cNvSpPr txBox="1"/>
+          <p:nvPr/>
+        </p:nvSpPr>
+        <p:spPr>
+          <a:xfrm>
+            <a:off x="16528810" y="1812937"/>
+            <a:ext cx="1076734" cy="369332"/>
+          </a:xfrm>
+          <a:prstGeom prst="rect">
+            <a:avLst/>
+          </a:prstGeom>
+          <a:noFill/>
+        </p:spPr>
+        <p:txBody>
+          <a:bodyPr wrap="square" rtlCol="0">
+            <a:spAutoFit/>
+          </a:bodyPr>
+          <a:lstStyle/>
+          <a:p>
+            <a:pPr algn="ctr"/>
+            <a:r>
+              <a:rPr lang="en-US" b="1" dirty="0"/>
+              <a:t>YES (596)</a:t>
+            </a:r>
+            <a:endParaRPr lang="en-US" dirty="0"/>
+          </a:p>
+        </p:txBody>
+      </p:sp>
+      <p:sp>
+        <p:nvSpPr>
+          <p:cNvPr id="209" name="TextBox 208">
+            <a:extLst>
+              <a:ext uri="{FF2B5EF4-FFF2-40B4-BE49-F238E27FC236}">
+                <a16:creationId xmlns:a16="http://schemas.microsoft.com/office/drawing/2014/main" id="{25EE85B6-FACE-0F41-8C7C-343C59E5AC20}"/>
+              </a:ext>
+            </a:extLst>
+          </p:cNvPr>
+          <p:cNvSpPr txBox="1"/>
+          <p:nvPr/>
+        </p:nvSpPr>
+        <p:spPr>
+          <a:xfrm>
+            <a:off x="16490710" y="2346337"/>
+            <a:ext cx="1272850" cy="369332"/>
+          </a:xfrm>
+          <a:prstGeom prst="rect">
+            <a:avLst/>
+          </a:prstGeom>
+          <a:noFill/>
+        </p:spPr>
+        <p:txBody>
+          <a:bodyPr wrap="square" rtlCol="0">
+            <a:spAutoFit/>
+          </a:bodyPr>
+          <a:lstStyle/>
+          <a:p>
+            <a:pPr algn="ctr"/>
+            <a:r>
+              <a:rPr lang="en-US" b="1" dirty="0"/>
+              <a:t>NO (</a:t>
+            </a:r>
+            <a:r>
+              <a:rPr lang="en-US" dirty="0"/>
+              <a:t>24105</a:t>
+            </a:r>
+            <a:r>
+              <a:rPr lang="en-US" b="1" dirty="0"/>
+              <a:t>)</a:t>
+            </a:r>
+            <a:endParaRPr lang="en-US" dirty="0"/>
+          </a:p>
+        </p:txBody>
+      </p:sp>
+      <p:sp>
+        <p:nvSpPr>
+          <p:cNvPr id="210" name="TextBox 209">
+            <a:extLst>
+              <a:ext uri="{FF2B5EF4-FFF2-40B4-BE49-F238E27FC236}">
+                <a16:creationId xmlns:a16="http://schemas.microsoft.com/office/drawing/2014/main" id="{C05D3D9E-15E2-5143-98E6-02ECB9ABCB23}"/>
+              </a:ext>
+            </a:extLst>
+          </p:cNvPr>
+          <p:cNvSpPr txBox="1"/>
+          <p:nvPr/>
+        </p:nvSpPr>
+        <p:spPr>
+          <a:xfrm>
+            <a:off x="17925810" y="1343037"/>
+            <a:ext cx="1076734" cy="369332"/>
+          </a:xfrm>
+          <a:prstGeom prst="rect">
+            <a:avLst/>
+          </a:prstGeom>
+          <a:noFill/>
+        </p:spPr>
+        <p:txBody>
+          <a:bodyPr wrap="square" rtlCol="0">
+            <a:spAutoFit/>
+          </a:bodyPr>
+          <a:lstStyle/>
+          <a:p>
+            <a:pPr algn="ctr"/>
+            <a:r>
+              <a:rPr lang="en-US" b="1" dirty="0"/>
+              <a:t>YES (884)</a:t>
+            </a:r>
+            <a:endParaRPr lang="en-US" dirty="0"/>
+          </a:p>
+        </p:txBody>
+      </p:sp>
+      <p:sp>
+        <p:nvSpPr>
+          <p:cNvPr id="256" name="TextBox 255">
+            <a:extLst>
+              <a:ext uri="{FF2B5EF4-FFF2-40B4-BE49-F238E27FC236}">
+                <a16:creationId xmlns:a16="http://schemas.microsoft.com/office/drawing/2014/main" id="{F4E2C865-FE74-CE4F-8000-5416904E7A88}"/>
+              </a:ext>
+            </a:extLst>
+          </p:cNvPr>
+          <p:cNvSpPr txBox="1"/>
+          <p:nvPr/>
+        </p:nvSpPr>
+        <p:spPr>
+          <a:xfrm>
+            <a:off x="19437109" y="1330337"/>
+            <a:ext cx="1268695" cy="369332"/>
+          </a:xfrm>
+          <a:prstGeom prst="rect">
+            <a:avLst/>
+          </a:prstGeom>
+          <a:noFill/>
+        </p:spPr>
+        <p:txBody>
+          <a:bodyPr wrap="square" rtlCol="0">
+            <a:spAutoFit/>
+          </a:bodyPr>
+          <a:lstStyle/>
+          <a:p>
+            <a:pPr algn="ctr"/>
+            <a:r>
+              <a:rPr lang="en-US" b="1" dirty="0"/>
+              <a:t>NO (</a:t>
+            </a:r>
+            <a:r>
+              <a:rPr lang="en-US" dirty="0"/>
+              <a:t>23817</a:t>
+            </a:r>
+            <a:r>
+              <a:rPr lang="en-US" b="1" dirty="0"/>
+              <a:t>)</a:t>
+            </a:r>
+            <a:endParaRPr lang="en-US" dirty="0"/>
+          </a:p>
+        </p:txBody>
+      </p:sp>
+      <p:sp>
+        <p:nvSpPr>
+          <p:cNvPr id="257" name="TextBox 256">
+            <a:extLst>
+              <a:ext uri="{FF2B5EF4-FFF2-40B4-BE49-F238E27FC236}">
+                <a16:creationId xmlns:a16="http://schemas.microsoft.com/office/drawing/2014/main" id="{7F4D2EC9-02BF-C74B-9128-00AEC8ED6C07}"/>
+              </a:ext>
+            </a:extLst>
+          </p:cNvPr>
+          <p:cNvSpPr txBox="1"/>
+          <p:nvPr/>
+        </p:nvSpPr>
+        <p:spPr>
+          <a:xfrm>
+            <a:off x="-131599" y="8708920"/>
+            <a:ext cx="2459407" cy="369332"/>
+          </a:xfrm>
+          <a:prstGeom prst="rect">
+            <a:avLst/>
+          </a:prstGeom>
+          <a:noFill/>
+        </p:spPr>
+        <p:txBody>
+          <a:bodyPr wrap="square" rtlCol="0">
+            <a:spAutoFit/>
+          </a:bodyPr>
+          <a:lstStyle/>
+          <a:p>
+            <a:pPr algn="ctr"/>
+            <a:r>
+              <a:rPr lang="en-US" b="1" dirty="0"/>
+              <a:t>raw p-value = 1.57*10</a:t>
+            </a:r>
+            <a:r>
+              <a:rPr lang="en-US" b="1" baseline="30000" dirty="0"/>
+              <a:t>-5</a:t>
+            </a:r>
+          </a:p>
+        </p:txBody>
+      </p:sp>
+      <p:sp>
+        <p:nvSpPr>
+          <p:cNvPr id="258" name="TextBox 257">
+            <a:extLst>
+              <a:ext uri="{FF2B5EF4-FFF2-40B4-BE49-F238E27FC236}">
+                <a16:creationId xmlns:a16="http://schemas.microsoft.com/office/drawing/2014/main" id="{61DE9436-748F-A74B-93B7-7F00E8B9E7CC}"/>
+              </a:ext>
+            </a:extLst>
+          </p:cNvPr>
+          <p:cNvSpPr txBox="1"/>
+          <p:nvPr/>
+        </p:nvSpPr>
+        <p:spPr>
+          <a:xfrm>
+            <a:off x="4931934" y="8704907"/>
+            <a:ext cx="2783359" cy="369332"/>
+          </a:xfrm>
+          <a:prstGeom prst="rect">
+            <a:avLst/>
+          </a:prstGeom>
+          <a:noFill/>
+        </p:spPr>
+        <p:txBody>
+          <a:bodyPr wrap="square" rtlCol="0">
+            <a:spAutoFit/>
+          </a:bodyPr>
+          <a:lstStyle/>
+          <a:p>
+            <a:pPr algn="ctr"/>
+            <a:r>
+              <a:rPr lang="en-US" dirty="0"/>
+              <a:t>raw p-value =</a:t>
+            </a:r>
+            <a:endParaRPr lang="en-US" baseline="30000" dirty="0"/>
+          </a:p>
+        </p:txBody>
+      </p:sp>
+      <p:sp>
+        <p:nvSpPr>
+          <p:cNvPr id="259" name="TextBox 258">
+            <a:extLst>
+              <a:ext uri="{FF2B5EF4-FFF2-40B4-BE49-F238E27FC236}">
+                <a16:creationId xmlns:a16="http://schemas.microsoft.com/office/drawing/2014/main" id="{2115D15F-229A-F14B-B2DA-FB12CFB59B85}"/>
+              </a:ext>
+            </a:extLst>
+          </p:cNvPr>
+          <p:cNvSpPr txBox="1"/>
+          <p:nvPr/>
+        </p:nvSpPr>
+        <p:spPr>
+          <a:xfrm>
+            <a:off x="2212617" y="8708920"/>
+            <a:ext cx="2783359" cy="369332"/>
+          </a:xfrm>
+          <a:prstGeom prst="rect">
+            <a:avLst/>
+          </a:prstGeom>
+          <a:noFill/>
+        </p:spPr>
+        <p:txBody>
+          <a:bodyPr wrap="square" rtlCol="0">
+            <a:spAutoFit/>
+          </a:bodyPr>
+          <a:lstStyle/>
+          <a:p>
+            <a:pPr algn="ctr"/>
+            <a:r>
+              <a:rPr lang="en-US" dirty="0"/>
+              <a:t>raw p-value = 0.19</a:t>
+            </a:r>
+            <a:endParaRPr lang="en-US" baseline="30000" dirty="0"/>
+          </a:p>
+        </p:txBody>
+      </p:sp>
+      <p:sp>
+        <p:nvSpPr>
+          <p:cNvPr id="260" name="TextBox 259">
+            <a:extLst>
+              <a:ext uri="{FF2B5EF4-FFF2-40B4-BE49-F238E27FC236}">
+                <a16:creationId xmlns:a16="http://schemas.microsoft.com/office/drawing/2014/main" id="{76E805C2-7BB8-AA4A-8E30-1B3EACB82DF0}"/>
+              </a:ext>
+            </a:extLst>
+          </p:cNvPr>
+          <p:cNvSpPr txBox="1"/>
+          <p:nvPr/>
+        </p:nvSpPr>
+        <p:spPr>
+          <a:xfrm>
+            <a:off x="7717820" y="8708920"/>
+            <a:ext cx="2331100" cy="369332"/>
+          </a:xfrm>
+          <a:prstGeom prst="rect">
+            <a:avLst/>
+          </a:prstGeom>
+          <a:noFill/>
+        </p:spPr>
+        <p:txBody>
+          <a:bodyPr wrap="square" rtlCol="0">
+            <a:spAutoFit/>
+          </a:bodyPr>
+          <a:lstStyle/>
+          <a:p>
+            <a:pPr algn="ctr"/>
+            <a:r>
+              <a:rPr lang="en-US" dirty="0"/>
+              <a:t>raw p-value =</a:t>
+            </a:r>
+            <a:endParaRPr lang="en-US" baseline="30000" dirty="0"/>
+          </a:p>
+        </p:txBody>
+      </p:sp>
+      <p:sp>
+        <p:nvSpPr>
+          <p:cNvPr id="261" name="TextBox 260">
+            <a:extLst>
+              <a:ext uri="{FF2B5EF4-FFF2-40B4-BE49-F238E27FC236}">
+                <a16:creationId xmlns:a16="http://schemas.microsoft.com/office/drawing/2014/main" id="{14538AEF-6864-7B4C-A63C-D6BA865CDC2F}"/>
+              </a:ext>
+            </a:extLst>
+          </p:cNvPr>
+          <p:cNvSpPr txBox="1"/>
+          <p:nvPr/>
+        </p:nvSpPr>
+        <p:spPr>
+          <a:xfrm>
+            <a:off x="13613430" y="460326"/>
+            <a:ext cx="2459407" cy="646331"/>
+          </a:xfrm>
+          <a:prstGeom prst="rect">
+            <a:avLst/>
+          </a:prstGeom>
+          <a:solidFill>
+            <a:schemeClr val="accent4">
+              <a:lumMod val="40000"/>
+              <a:lumOff val="60000"/>
+            </a:schemeClr>
+          </a:solidFill>
+        </p:spPr>
+        <p:txBody>
+          <a:bodyPr wrap="square" rtlCol="0">
+            <a:spAutoFit/>
+          </a:bodyPr>
+          <a:lstStyle/>
+          <a:p>
+            <a:pPr algn="ctr"/>
+            <a:r>
+              <a:rPr lang="en-US" b="1" dirty="0"/>
+              <a:t>Matrix for ”</a:t>
+            </a:r>
+            <a:r>
+              <a:rPr lang="en-US" b="1" dirty="0" err="1"/>
+              <a:t>wa</a:t>
+            </a:r>
+            <a:r>
+              <a:rPr lang="en-US" b="1" dirty="0"/>
+              <a:t>”</a:t>
+            </a:r>
+          </a:p>
+          <a:p>
+            <a:pPr algn="ctr"/>
+            <a:r>
+              <a:rPr lang="en-US" dirty="0"/>
+              <a:t>(Writer of Active mark)</a:t>
+            </a:r>
+          </a:p>
+        </p:txBody>
+      </p:sp>
+      <p:graphicFrame>
+        <p:nvGraphicFramePr>
+          <p:cNvPr id="262" name="Table 2">
+            <a:extLst>
+              <a:ext uri="{FF2B5EF4-FFF2-40B4-BE49-F238E27FC236}">
+                <a16:creationId xmlns:a16="http://schemas.microsoft.com/office/drawing/2014/main" id="{1283A5B9-88DB-CD44-8059-4EA20AFCF489}"/>
+              </a:ext>
+            </a:extLst>
+          </p:cNvPr>
+          <p:cNvGraphicFramePr>
+            <a:graphicFrameLocks noGrp="1"/>
+          </p:cNvGraphicFramePr>
+          <p:nvPr>
+            <p:extLst>
+              <p:ext uri="{D42A27DB-BD31-4B8C-83A1-F6EECF244321}">
+                <p14:modId xmlns:p14="http://schemas.microsoft.com/office/powerpoint/2010/main" val="2280229678"/>
+              </p:ext>
+            </p:extLst>
+          </p:nvPr>
+        </p:nvGraphicFramePr>
+        <p:xfrm>
+          <a:off x="17848214" y="6150566"/>
+          <a:ext cx="2965628" cy="987552"/>
+        </p:xfrm>
+        <a:graphic>
+          <a:graphicData uri="http://schemas.openxmlformats.org/drawingml/2006/table">
+            <a:tbl>
+              <a:tblPr firstRow="1" bandRow="1">
+                <a:tableStyleId>{5940675A-B579-460E-94D1-54222C63F5DA}</a:tableStyleId>
+              </a:tblPr>
+              <a:tblGrid>
+                <a:gridCol w="1482814">
+                  <a:extLst>
+                    <a:ext uri="{9D8B030D-6E8A-4147-A177-3AD203B41FA5}">
+                      <a16:colId xmlns:a16="http://schemas.microsoft.com/office/drawing/2014/main" val="1817326449"/>
+                    </a:ext>
+                  </a:extLst>
+                </a:gridCol>
+                <a:gridCol w="1482814">
+                  <a:extLst>
+                    <a:ext uri="{9D8B030D-6E8A-4147-A177-3AD203B41FA5}">
+                      <a16:colId xmlns:a16="http://schemas.microsoft.com/office/drawing/2014/main" val="1367557698"/>
+                    </a:ext>
+                  </a:extLst>
+                </a:gridCol>
+              </a:tblGrid>
+              <a:tr h="370840">
+                <a:tc>
+                  <a:txBody>
+                    <a:bodyPr/>
+                    <a:lstStyle/>
+                    <a:p>
+                      <a:r>
+                        <a:rPr lang="en-US" dirty="0"/>
+                        <a:t>10</a:t>
+                      </a:r>
+                    </a:p>
+                  </a:txBody>
+                  <a:tcPr/>
+                </a:tc>
+                <a:tc>
+                  <a:txBody>
+                    <a:bodyPr/>
+                    <a:lstStyle/>
+                    <a:p>
+                      <a:r>
+                        <a:rPr lang="en-US" dirty="0"/>
+                        <a:t>422</a:t>
+                      </a:r>
+                    </a:p>
+                  </a:txBody>
+                  <a:tcPr/>
+                </a:tc>
+                <a:extLst>
+                  <a:ext uri="{0D108BD9-81ED-4DB2-BD59-A6C34878D82A}">
+                    <a16:rowId xmlns:a16="http://schemas.microsoft.com/office/drawing/2014/main" val="3537880068"/>
+                  </a:ext>
+                </a:extLst>
+              </a:tr>
+              <a:tr h="370840">
+                <a:tc>
+                  <a:txBody>
+                    <a:bodyPr/>
+                    <a:lstStyle/>
+                    <a:p>
+                      <a:r>
+                        <a:rPr lang="en-US" dirty="0"/>
+                        <a:t>874</a:t>
+                      </a:r>
+                    </a:p>
+                  </a:txBody>
+                  <a:tcPr/>
+                </a:tc>
+                <a:tc>
+                  <a:txBody>
+                    <a:bodyPr/>
+                    <a:lstStyle/>
+                    <a:p>
+                      <a:r>
+                        <a:rPr lang="en-US" sz="2640" b="0" i="0" kern="1200" dirty="0">
+                          <a:solidFill>
+                            <a:schemeClr val="tx1"/>
+                          </a:solidFill>
+                          <a:effectLst/>
+                          <a:latin typeface="+mn-lt"/>
+                          <a:ea typeface="+mn-ea"/>
+                          <a:cs typeface="+mn-cs"/>
+                        </a:rPr>
+                        <a:t>23395</a:t>
+                      </a:r>
+                      <a:endParaRPr lang="en-US" dirty="0"/>
+                    </a:p>
+                  </a:txBody>
+                  <a:tcPr/>
+                </a:tc>
+                <a:extLst>
+                  <a:ext uri="{0D108BD9-81ED-4DB2-BD59-A6C34878D82A}">
+                    <a16:rowId xmlns:a16="http://schemas.microsoft.com/office/drawing/2014/main" val="3286202952"/>
+                  </a:ext>
+                </a:extLst>
+              </a:tr>
+            </a:tbl>
+          </a:graphicData>
+        </a:graphic>
+      </p:graphicFrame>
+      <p:sp>
+        <p:nvSpPr>
+          <p:cNvPr id="263" name="TextBox 262">
+            <a:extLst>
+              <a:ext uri="{FF2B5EF4-FFF2-40B4-BE49-F238E27FC236}">
+                <a16:creationId xmlns:a16="http://schemas.microsoft.com/office/drawing/2014/main" id="{9E368AB4-C4C3-EA4B-A1A1-2F74D6ABA336}"/>
+              </a:ext>
+            </a:extLst>
+          </p:cNvPr>
+          <p:cNvSpPr txBox="1"/>
+          <p:nvPr/>
+        </p:nvSpPr>
+        <p:spPr>
+          <a:xfrm>
+            <a:off x="16528810" y="4894361"/>
+            <a:ext cx="5795095" cy="646331"/>
+          </a:xfrm>
+          <a:prstGeom prst="rect">
+            <a:avLst/>
+          </a:prstGeom>
+          <a:noFill/>
+        </p:spPr>
+        <p:txBody>
+          <a:bodyPr wrap="square" rtlCol="0">
+            <a:spAutoFit/>
+          </a:bodyPr>
+          <a:lstStyle/>
+          <a:p>
+            <a:pPr algn="ctr"/>
+            <a:r>
+              <a:rPr lang="en-US" dirty="0"/>
+              <a:t>Gene has associated </a:t>
+            </a:r>
+            <a:r>
+              <a:rPr lang="en-US" dirty="0" err="1"/>
+              <a:t>Himorna</a:t>
+            </a:r>
+            <a:r>
+              <a:rPr lang="en-US" dirty="0"/>
+              <a:t> peak with</a:t>
+            </a:r>
+            <a:r>
+              <a:rPr lang="en-US" b="1" dirty="0"/>
+              <a:t> positive correlation </a:t>
+            </a:r>
+            <a:r>
+              <a:rPr lang="en-US" dirty="0"/>
+              <a:t>between lncRNA RP11-398K22.12  and H3K27ac</a:t>
+            </a:r>
+          </a:p>
+        </p:txBody>
+      </p:sp>
+      <p:sp>
+        <p:nvSpPr>
+          <p:cNvPr id="264" name="TextBox 263">
+            <a:extLst>
+              <a:ext uri="{FF2B5EF4-FFF2-40B4-BE49-F238E27FC236}">
+                <a16:creationId xmlns:a16="http://schemas.microsoft.com/office/drawing/2014/main" id="{48E14256-D839-AC4A-BF20-1E07E4FE790E}"/>
+              </a:ext>
+            </a:extLst>
+          </p:cNvPr>
+          <p:cNvSpPr txBox="1"/>
+          <p:nvPr/>
+        </p:nvSpPr>
+        <p:spPr>
+          <a:xfrm>
+            <a:off x="13631692" y="6065623"/>
+            <a:ext cx="2686022" cy="923330"/>
+          </a:xfrm>
+          <a:prstGeom prst="rect">
+            <a:avLst/>
+          </a:prstGeom>
+          <a:noFill/>
+        </p:spPr>
+        <p:txBody>
+          <a:bodyPr wrap="square" rtlCol="0">
+            <a:spAutoFit/>
+          </a:bodyPr>
+          <a:lstStyle/>
+          <a:p>
+            <a:pPr algn="ctr"/>
+            <a:r>
+              <a:rPr lang="en-US" dirty="0"/>
+              <a:t>Gene </a:t>
+            </a:r>
+            <a:r>
+              <a:rPr lang="en-US" b="1" dirty="0"/>
+              <a:t>upregulated</a:t>
+            </a:r>
+            <a:r>
+              <a:rPr lang="en-US" dirty="0"/>
+              <a:t> after lncRNA RP11-398K22.12 knockdown</a:t>
+            </a:r>
+          </a:p>
+        </p:txBody>
+      </p:sp>
+      <p:sp>
+        <p:nvSpPr>
+          <p:cNvPr id="265" name="TextBox 264">
+            <a:extLst>
+              <a:ext uri="{FF2B5EF4-FFF2-40B4-BE49-F238E27FC236}">
+                <a16:creationId xmlns:a16="http://schemas.microsoft.com/office/drawing/2014/main" id="{B59BF7A6-6DE7-A64B-B0B9-53112830182A}"/>
+              </a:ext>
+            </a:extLst>
+          </p:cNvPr>
+          <p:cNvSpPr txBox="1"/>
+          <p:nvPr/>
+        </p:nvSpPr>
+        <p:spPr>
+          <a:xfrm>
+            <a:off x="16528810" y="6065623"/>
+            <a:ext cx="1076734" cy="369332"/>
+          </a:xfrm>
+          <a:prstGeom prst="rect">
+            <a:avLst/>
+          </a:prstGeom>
+          <a:noFill/>
+        </p:spPr>
+        <p:txBody>
+          <a:bodyPr wrap="square" rtlCol="0">
+            <a:spAutoFit/>
+          </a:bodyPr>
+          <a:lstStyle/>
+          <a:p>
+            <a:pPr algn="ctr"/>
+            <a:r>
+              <a:rPr lang="en-US" b="1" dirty="0"/>
+              <a:t>YES (432)</a:t>
+            </a:r>
+            <a:endParaRPr lang="en-US" dirty="0"/>
+          </a:p>
+        </p:txBody>
+      </p:sp>
+      <p:sp>
+        <p:nvSpPr>
+          <p:cNvPr id="266" name="TextBox 265">
+            <a:extLst>
+              <a:ext uri="{FF2B5EF4-FFF2-40B4-BE49-F238E27FC236}">
+                <a16:creationId xmlns:a16="http://schemas.microsoft.com/office/drawing/2014/main" id="{CCB50463-5A8C-B842-B75B-70070823BF17}"/>
+              </a:ext>
+            </a:extLst>
+          </p:cNvPr>
+          <p:cNvSpPr txBox="1"/>
+          <p:nvPr/>
+        </p:nvSpPr>
+        <p:spPr>
+          <a:xfrm>
+            <a:off x="16490710" y="6599023"/>
+            <a:ext cx="1272850" cy="369332"/>
+          </a:xfrm>
+          <a:prstGeom prst="rect">
+            <a:avLst/>
+          </a:prstGeom>
+          <a:noFill/>
+        </p:spPr>
+        <p:txBody>
+          <a:bodyPr wrap="square" rtlCol="0">
+            <a:spAutoFit/>
+          </a:bodyPr>
+          <a:lstStyle/>
+          <a:p>
+            <a:pPr algn="ctr"/>
+            <a:r>
+              <a:rPr lang="en-US" b="1" dirty="0"/>
+              <a:t>NO (</a:t>
+            </a:r>
+            <a:r>
+              <a:rPr lang="en-US" dirty="0"/>
+              <a:t>24269</a:t>
+            </a:r>
+            <a:r>
+              <a:rPr lang="en-US" b="1" dirty="0"/>
+              <a:t>)</a:t>
+            </a:r>
+            <a:endParaRPr lang="en-US" dirty="0"/>
+          </a:p>
+        </p:txBody>
+      </p:sp>
+      <p:sp>
+        <p:nvSpPr>
+          <p:cNvPr id="267" name="TextBox 266">
+            <a:extLst>
+              <a:ext uri="{FF2B5EF4-FFF2-40B4-BE49-F238E27FC236}">
+                <a16:creationId xmlns:a16="http://schemas.microsoft.com/office/drawing/2014/main" id="{47D4E0CF-FB64-EC43-B867-F95B9D94E63D}"/>
+              </a:ext>
+            </a:extLst>
+          </p:cNvPr>
+          <p:cNvSpPr txBox="1"/>
+          <p:nvPr/>
+        </p:nvSpPr>
+        <p:spPr>
+          <a:xfrm>
+            <a:off x="17925810" y="5595723"/>
+            <a:ext cx="1076734" cy="369332"/>
+          </a:xfrm>
+          <a:prstGeom prst="rect">
+            <a:avLst/>
+          </a:prstGeom>
+          <a:noFill/>
+        </p:spPr>
+        <p:txBody>
+          <a:bodyPr wrap="square" rtlCol="0">
+            <a:spAutoFit/>
+          </a:bodyPr>
+          <a:lstStyle/>
+          <a:p>
+            <a:pPr algn="ctr"/>
+            <a:r>
+              <a:rPr lang="en-US" b="1" dirty="0"/>
+              <a:t>YES (884)</a:t>
+            </a:r>
+            <a:endParaRPr lang="en-US" dirty="0"/>
+          </a:p>
+        </p:txBody>
+      </p:sp>
+      <p:sp>
+        <p:nvSpPr>
+          <p:cNvPr id="268" name="TextBox 267">
+            <a:extLst>
+              <a:ext uri="{FF2B5EF4-FFF2-40B4-BE49-F238E27FC236}">
+                <a16:creationId xmlns:a16="http://schemas.microsoft.com/office/drawing/2014/main" id="{5AF04E45-C764-1F48-8C46-4141178357BB}"/>
+              </a:ext>
+            </a:extLst>
+          </p:cNvPr>
+          <p:cNvSpPr txBox="1"/>
+          <p:nvPr/>
+        </p:nvSpPr>
+        <p:spPr>
+          <a:xfrm>
+            <a:off x="19437109" y="5583023"/>
+            <a:ext cx="1268695" cy="369332"/>
+          </a:xfrm>
+          <a:prstGeom prst="rect">
+            <a:avLst/>
+          </a:prstGeom>
+          <a:noFill/>
+        </p:spPr>
+        <p:txBody>
+          <a:bodyPr wrap="square" rtlCol="0">
+            <a:spAutoFit/>
+          </a:bodyPr>
+          <a:lstStyle/>
+          <a:p>
+            <a:pPr algn="ctr"/>
+            <a:r>
+              <a:rPr lang="en-US" b="1" dirty="0"/>
+              <a:t>NO (</a:t>
+            </a:r>
+            <a:r>
+              <a:rPr lang="en-US" dirty="0"/>
+              <a:t>23817</a:t>
+            </a:r>
+            <a:r>
+              <a:rPr lang="en-US" b="1" dirty="0"/>
+              <a:t>)</a:t>
+            </a:r>
+            <a:endParaRPr lang="en-US" dirty="0"/>
+          </a:p>
+        </p:txBody>
+      </p:sp>
+      <p:sp>
+        <p:nvSpPr>
+          <p:cNvPr id="269" name="TextBox 268">
+            <a:extLst>
+              <a:ext uri="{FF2B5EF4-FFF2-40B4-BE49-F238E27FC236}">
+                <a16:creationId xmlns:a16="http://schemas.microsoft.com/office/drawing/2014/main" id="{8F6B35DF-62F6-7544-8933-57A9F62A66EC}"/>
+              </a:ext>
+            </a:extLst>
+          </p:cNvPr>
+          <p:cNvSpPr txBox="1"/>
+          <p:nvPr/>
+        </p:nvSpPr>
+        <p:spPr>
+          <a:xfrm>
+            <a:off x="13613430" y="4713012"/>
+            <a:ext cx="2459407" cy="923330"/>
+          </a:xfrm>
+          <a:prstGeom prst="rect">
+            <a:avLst/>
+          </a:prstGeom>
+          <a:solidFill>
+            <a:schemeClr val="accent4">
+              <a:lumMod val="40000"/>
+              <a:lumOff val="60000"/>
+            </a:schemeClr>
+          </a:solidFill>
+        </p:spPr>
+        <p:txBody>
+          <a:bodyPr wrap="square" rtlCol="0">
+            <a:spAutoFit/>
+          </a:bodyPr>
+          <a:lstStyle/>
+          <a:p>
+            <a:pPr algn="ctr"/>
+            <a:r>
+              <a:rPr lang="en-US" b="1" dirty="0"/>
+              <a:t>Matrix for ”</a:t>
+            </a:r>
+            <a:r>
+              <a:rPr lang="en-US" b="1" dirty="0" err="1"/>
+              <a:t>wr</a:t>
+            </a:r>
+            <a:r>
+              <a:rPr lang="en-US" b="1" dirty="0"/>
+              <a:t>”</a:t>
+            </a:r>
+          </a:p>
+          <a:p>
+            <a:pPr algn="ctr"/>
+            <a:r>
+              <a:rPr lang="en-US" dirty="0"/>
+              <a:t>(Writer of Repressive mark)</a:t>
+            </a:r>
+          </a:p>
+        </p:txBody>
+      </p:sp>
+      <p:sp>
+        <p:nvSpPr>
+          <p:cNvPr id="270" name="TextBox 269">
+            <a:extLst>
+              <a:ext uri="{FF2B5EF4-FFF2-40B4-BE49-F238E27FC236}">
+                <a16:creationId xmlns:a16="http://schemas.microsoft.com/office/drawing/2014/main" id="{04DAEDA3-39C8-3740-8A3F-E575388D6ADE}"/>
+              </a:ext>
+            </a:extLst>
+          </p:cNvPr>
+          <p:cNvSpPr txBox="1"/>
+          <p:nvPr/>
+        </p:nvSpPr>
+        <p:spPr>
+          <a:xfrm>
+            <a:off x="22950" y="5957427"/>
+            <a:ext cx="2189668" cy="646331"/>
+          </a:xfrm>
+          <a:prstGeom prst="rect">
+            <a:avLst/>
+          </a:prstGeom>
+          <a:solidFill>
+            <a:schemeClr val="accent4">
+              <a:lumMod val="40000"/>
+              <a:lumOff val="60000"/>
+            </a:schemeClr>
+          </a:solidFill>
+        </p:spPr>
+        <p:txBody>
+          <a:bodyPr wrap="square" rtlCol="0">
+            <a:spAutoFit/>
+          </a:bodyPr>
+          <a:lstStyle/>
+          <a:p>
+            <a:pPr algn="ctr"/>
+            <a:r>
+              <a:rPr lang="en-US" dirty="0"/>
+              <a:t>Confusion matrix</a:t>
+            </a:r>
+          </a:p>
+          <a:p>
+            <a:pPr algn="ctr"/>
+            <a:r>
+              <a:rPr lang="en-US" b="1" dirty="0"/>
+              <a:t> for ”</a:t>
+            </a:r>
+            <a:r>
+              <a:rPr lang="en-US" b="1" dirty="0" err="1"/>
+              <a:t>wa</a:t>
+            </a:r>
+            <a:r>
+              <a:rPr lang="en-US" b="1" dirty="0"/>
+              <a:t>”</a:t>
+            </a:r>
+          </a:p>
+        </p:txBody>
+      </p:sp>
+      <p:sp>
+        <p:nvSpPr>
+          <p:cNvPr id="271" name="TextBox 270">
+            <a:extLst>
+              <a:ext uri="{FF2B5EF4-FFF2-40B4-BE49-F238E27FC236}">
+                <a16:creationId xmlns:a16="http://schemas.microsoft.com/office/drawing/2014/main" id="{480ED370-5CF8-6D47-9B9A-7E9DEFA0AE5C}"/>
+              </a:ext>
+            </a:extLst>
+          </p:cNvPr>
+          <p:cNvSpPr txBox="1"/>
+          <p:nvPr/>
+        </p:nvSpPr>
+        <p:spPr>
+          <a:xfrm>
+            <a:off x="2342229" y="5957427"/>
+            <a:ext cx="2459407" cy="646331"/>
+          </a:xfrm>
+          <a:prstGeom prst="rect">
+            <a:avLst/>
+          </a:prstGeom>
+          <a:solidFill>
+            <a:schemeClr val="accent4">
+              <a:lumMod val="40000"/>
+              <a:lumOff val="60000"/>
+            </a:schemeClr>
+          </a:solidFill>
+        </p:spPr>
+        <p:txBody>
+          <a:bodyPr wrap="square" rtlCol="0">
+            <a:spAutoFit/>
+          </a:bodyPr>
+          <a:lstStyle/>
+          <a:p>
+            <a:pPr algn="ctr"/>
+            <a:r>
+              <a:rPr lang="en-US" dirty="0"/>
+              <a:t>Confusion matrix</a:t>
+            </a:r>
+          </a:p>
+          <a:p>
+            <a:pPr algn="ctr"/>
+            <a:r>
+              <a:rPr lang="en-US" b="1" dirty="0"/>
+              <a:t>for ”</a:t>
+            </a:r>
+            <a:r>
+              <a:rPr lang="en-US" b="1" dirty="0" err="1"/>
+              <a:t>wr</a:t>
+            </a:r>
+            <a:r>
+              <a:rPr lang="en-US" b="1" dirty="0"/>
+              <a:t>”</a:t>
+            </a:r>
+          </a:p>
+        </p:txBody>
+      </p:sp>
+      <p:grpSp>
+        <p:nvGrpSpPr>
+          <p:cNvPr id="272" name="Group 271">
+            <a:extLst>
+              <a:ext uri="{FF2B5EF4-FFF2-40B4-BE49-F238E27FC236}">
+                <a16:creationId xmlns:a16="http://schemas.microsoft.com/office/drawing/2014/main" id="{2B297C96-044A-F34C-929A-8025A4FC8169}"/>
+              </a:ext>
+            </a:extLst>
+          </p:cNvPr>
+          <p:cNvGrpSpPr/>
+          <p:nvPr/>
+        </p:nvGrpSpPr>
+        <p:grpSpPr>
+          <a:xfrm>
+            <a:off x="10165106" y="1468114"/>
+            <a:ext cx="1202724" cy="444766"/>
+            <a:chOff x="226259" y="4616649"/>
+            <a:chExt cx="1202724" cy="444766"/>
+          </a:xfrm>
+        </p:grpSpPr>
+        <p:cxnSp>
+          <p:nvCxnSpPr>
+            <p:cNvPr id="273" name="Straight Connector 272">
+              <a:extLst>
+                <a:ext uri="{FF2B5EF4-FFF2-40B4-BE49-F238E27FC236}">
+                  <a16:creationId xmlns:a16="http://schemas.microsoft.com/office/drawing/2014/main" id="{35B41200-29C8-814E-8559-EE7B08B7A78C}"/>
+                </a:ext>
+              </a:extLst>
+            </p:cNvPr>
+            <p:cNvCxnSpPr>
+              <a:cxnSpLocks/>
+            </p:cNvCxnSpPr>
+            <p:nvPr/>
+          </p:nvCxnSpPr>
+          <p:spPr>
+            <a:xfrm>
+              <a:off x="226259" y="4839032"/>
+              <a:ext cx="1202724" cy="0"/>
+            </a:xfrm>
+            <a:prstGeom prst="line">
+              <a:avLst/>
+            </a:prstGeom>
+            <a:ln w="19050">
+              <a:solidFill>
+                <a:schemeClr val="tx1"/>
+              </a:solidFill>
+            </a:ln>
+          </p:spPr>
+          <p:style>
+            <a:lnRef idx="1">
+              <a:schemeClr val="accent1"/>
+            </a:lnRef>
+            <a:fillRef idx="0">
+              <a:schemeClr val="accent1"/>
+            </a:fillRef>
+            <a:effectRef idx="0">
+              <a:schemeClr val="accent1"/>
+            </a:effectRef>
+            <a:fontRef idx="minor">
+              <a:schemeClr val="tx1"/>
+            </a:fontRef>
+          </p:style>
+        </p:cxnSp>
+        <p:sp>
+          <p:nvSpPr>
+            <p:cNvPr id="274" name="Right Arrow 273">
+              <a:extLst>
+                <a:ext uri="{FF2B5EF4-FFF2-40B4-BE49-F238E27FC236}">
+                  <a16:creationId xmlns:a16="http://schemas.microsoft.com/office/drawing/2014/main" id="{FD2C4C05-9A37-3043-82B9-40C84B4466CF}"/>
+                </a:ext>
+              </a:extLst>
+            </p:cNvPr>
+            <p:cNvSpPr/>
+            <p:nvPr/>
+          </p:nvSpPr>
+          <p:spPr>
+            <a:xfrm>
+              <a:off x="693755" y="4616649"/>
+              <a:ext cx="601362" cy="444766"/>
+            </a:xfrm>
+            <a:prstGeom prst="rightArrow">
+              <a:avLst/>
+            </a:prstGeom>
+            <a:solidFill>
+              <a:schemeClr val="bg1"/>
+            </a:solidFill>
+          </p:spPr>
+          <p:style>
+            <a:lnRef idx="2">
+              <a:schemeClr val="dk1"/>
+            </a:lnRef>
+            <a:fillRef idx="1">
+              <a:schemeClr val="lt1"/>
+            </a:fillRef>
+            <a:effectRef idx="0">
+              <a:schemeClr val="dk1"/>
+            </a:effectRef>
+            <a:fontRef idx="minor">
+              <a:schemeClr val="dk1"/>
+            </a:fontRef>
+          </p:style>
+          <p:txBody>
+            <a:bodyPr rtlCol="0" anchor="ctr"/>
+            <a:lstStyle/>
+            <a:p>
+              <a:pPr algn="ctr"/>
+              <a:endParaRPr lang="en-US"/>
+            </a:p>
+          </p:txBody>
+        </p:sp>
+        <p:sp>
+          <p:nvSpPr>
+            <p:cNvPr id="275" name="Rectangle 274">
+              <a:extLst>
+                <a:ext uri="{FF2B5EF4-FFF2-40B4-BE49-F238E27FC236}">
+                  <a16:creationId xmlns:a16="http://schemas.microsoft.com/office/drawing/2014/main" id="{0E376932-555F-F549-A93F-78F01ECCD506}"/>
+                </a:ext>
+              </a:extLst>
+            </p:cNvPr>
+            <p:cNvSpPr/>
+            <p:nvPr/>
+          </p:nvSpPr>
+          <p:spPr>
+            <a:xfrm>
+              <a:off x="389237" y="4716815"/>
+              <a:ext cx="158016" cy="245087"/>
+            </a:xfrm>
+            <a:prstGeom prst="rect">
+              <a:avLst/>
+            </a:prstGeom>
+            <a:solidFill>
+              <a:schemeClr val="accent6">
+                <a:lumMod val="40000"/>
+                <a:lumOff val="60000"/>
+              </a:schemeClr>
+            </a:solidFill>
+          </p:spPr>
+          <p:style>
+            <a:lnRef idx="2">
+              <a:schemeClr val="dk1"/>
+            </a:lnRef>
+            <a:fillRef idx="1">
+              <a:schemeClr val="lt1"/>
+            </a:fillRef>
+            <a:effectRef idx="0">
+              <a:schemeClr val="dk1"/>
+            </a:effectRef>
+            <a:fontRef idx="minor">
+              <a:schemeClr val="dk1"/>
+            </a:fontRef>
+          </p:style>
+          <p:txBody>
+            <a:bodyPr rtlCol="0" anchor="ctr"/>
+            <a:lstStyle/>
+            <a:p>
+              <a:pPr algn="ctr"/>
+              <a:endParaRPr lang="en-US"/>
+            </a:p>
+          </p:txBody>
+        </p:sp>
+      </p:grpSp>
     </p:spTree>
     <p:extLst>
       <p:ext uri="{BB962C8B-B14F-4D97-AF65-F5344CB8AC3E}">

</xml_diff>

<commit_message>
1 new figure and 1 figure was updated
</commit_message>
<xml_diff>
--- a/images/four_roles.pptx
+++ b/images/four_roles.pptx
@@ -197,7 +197,7 @@
           <a:p>
             <a:fld id="{5287E838-B934-9A4E-A2B5-3CCDE18DB13D}" type="datetimeFigureOut">
               <a:rPr lang="en-US" smtClean="0"/>
-              <a:t>8/8/23</a:t>
+              <a:t>10/5/23</a:t>
             </a:fld>
             <a:endParaRPr lang="en-US"/>
           </a:p>
@@ -687,7 +687,7 @@
           <a:p>
             <a:fld id="{6791DA09-DD71-9144-9C0F-73C0A1D070B2}" type="datetimeFigureOut">
               <a:rPr lang="en-US" smtClean="0"/>
-              <a:t>8/8/23</a:t>
+              <a:t>10/5/23</a:t>
             </a:fld>
             <a:endParaRPr lang="en-US"/>
           </a:p>
@@ -857,7 +857,7 @@
           <a:p>
             <a:fld id="{6791DA09-DD71-9144-9C0F-73C0A1D070B2}" type="datetimeFigureOut">
               <a:rPr lang="en-US" smtClean="0"/>
-              <a:t>8/8/23</a:t>
+              <a:t>10/5/23</a:t>
             </a:fld>
             <a:endParaRPr lang="en-US"/>
           </a:p>
@@ -1037,7 +1037,7 @@
           <a:p>
             <a:fld id="{6791DA09-DD71-9144-9C0F-73C0A1D070B2}" type="datetimeFigureOut">
               <a:rPr lang="en-US" smtClean="0"/>
-              <a:t>8/8/23</a:t>
+              <a:t>10/5/23</a:t>
             </a:fld>
             <a:endParaRPr lang="en-US"/>
           </a:p>
@@ -1207,7 +1207,7 @@
           <a:p>
             <a:fld id="{6791DA09-DD71-9144-9C0F-73C0A1D070B2}" type="datetimeFigureOut">
               <a:rPr lang="en-US" smtClean="0"/>
-              <a:t>8/8/23</a:t>
+              <a:t>10/5/23</a:t>
             </a:fld>
             <a:endParaRPr lang="en-US"/>
           </a:p>
@@ -1451,7 +1451,7 @@
           <a:p>
             <a:fld id="{6791DA09-DD71-9144-9C0F-73C0A1D070B2}" type="datetimeFigureOut">
               <a:rPr lang="en-US" smtClean="0"/>
-              <a:t>8/8/23</a:t>
+              <a:t>10/5/23</a:t>
             </a:fld>
             <a:endParaRPr lang="en-US"/>
           </a:p>
@@ -1683,7 +1683,7 @@
           <a:p>
             <a:fld id="{6791DA09-DD71-9144-9C0F-73C0A1D070B2}" type="datetimeFigureOut">
               <a:rPr lang="en-US" smtClean="0"/>
-              <a:t>8/8/23</a:t>
+              <a:t>10/5/23</a:t>
             </a:fld>
             <a:endParaRPr lang="en-US"/>
           </a:p>
@@ -2050,7 +2050,7 @@
           <a:p>
             <a:fld id="{6791DA09-DD71-9144-9C0F-73C0A1D070B2}" type="datetimeFigureOut">
               <a:rPr lang="en-US" smtClean="0"/>
-              <a:t>8/8/23</a:t>
+              <a:t>10/5/23</a:t>
             </a:fld>
             <a:endParaRPr lang="en-US"/>
           </a:p>
@@ -2168,7 +2168,7 @@
           <a:p>
             <a:fld id="{6791DA09-DD71-9144-9C0F-73C0A1D070B2}" type="datetimeFigureOut">
               <a:rPr lang="en-US" smtClean="0"/>
-              <a:t>8/8/23</a:t>
+              <a:t>10/5/23</a:t>
             </a:fld>
             <a:endParaRPr lang="en-US"/>
           </a:p>
@@ -2263,7 +2263,7 @@
           <a:p>
             <a:fld id="{6791DA09-DD71-9144-9C0F-73C0A1D070B2}" type="datetimeFigureOut">
               <a:rPr lang="en-US" smtClean="0"/>
-              <a:t>8/8/23</a:t>
+              <a:t>10/5/23</a:t>
             </a:fld>
             <a:endParaRPr lang="en-US"/>
           </a:p>
@@ -2540,7 +2540,7 @@
           <a:p>
             <a:fld id="{6791DA09-DD71-9144-9C0F-73C0A1D070B2}" type="datetimeFigureOut">
               <a:rPr lang="en-US" smtClean="0"/>
-              <a:t>8/8/23</a:t>
+              <a:t>10/5/23</a:t>
             </a:fld>
             <a:endParaRPr lang="en-US"/>
           </a:p>
@@ -2797,7 +2797,7 @@
           <a:p>
             <a:fld id="{6791DA09-DD71-9144-9C0F-73C0A1D070B2}" type="datetimeFigureOut">
               <a:rPr lang="en-US" smtClean="0"/>
-              <a:t>8/8/23</a:t>
+              <a:t>10/5/23</a:t>
             </a:fld>
             <a:endParaRPr lang="en-US"/>
           </a:p>
@@ -3010,7 +3010,7 @@
           <a:p>
             <a:fld id="{6791DA09-DD71-9144-9C0F-73C0A1D070B2}" type="datetimeFigureOut">
               <a:rPr lang="en-US" smtClean="0"/>
-              <a:t>8/8/23</a:t>
+              <a:t>10/5/23</a:t>
             </a:fld>
             <a:endParaRPr lang="en-US"/>
           </a:p>
@@ -4469,7 +4469,11 @@
           <a:p>
             <a:pPr algn="r"/>
             <a:r>
-              <a:rPr lang="en-US" b="1" dirty="0"/>
+              <a:rPr lang="en-US" b="1" dirty="0">
+                <a:highlight>
+                  <a:srgbClr val="FFFF00"/>
+                </a:highlight>
+              </a:rPr>
               <a:t>X regions</a:t>
             </a:r>
             <a:r>
@@ -4484,7 +4488,11 @@
           <a:p>
             <a:pPr algn="r"/>
             <a:r>
-              <a:rPr lang="en-US" b="1" dirty="0"/>
+              <a:rPr lang="en-US" b="1" dirty="0">
+                <a:highlight>
+                  <a:srgbClr val="FFFF00"/>
+                </a:highlight>
+              </a:rPr>
               <a:t>Y regions</a:t>
             </a:r>
             <a:r>

</xml_diff>